<commit_message>
first draft of oauth poster done
</commit_message>
<xml_diff>
--- a/posters/oauthposter.pptx
+++ b/posters/oauthposter.pptx
@@ -1,6 +1,6 @@
 
 <file path=ppt/presentation.xml><?xml version="1.0" encoding="utf-8"?>
-<p:presentation xmlns:a="http://schemas.openxmlformats.org/drawingml/2006/main" xmlns:p="http://schemas.openxmlformats.org/presentationml/2006/main" xmlns:r="http://schemas.openxmlformats.org/officeDocument/2006/relationships">
+<p:presentation xmlns:a="http://schemas.openxmlformats.org/drawingml/2006/main" xmlns:p="http://schemas.openxmlformats.org/presentationml/2006/main" xmlns:r="http://schemas.openxmlformats.org/officeDocument/2006/relationships" xmlns:p14="http://schemas.microsoft.com/office/powerpoint/2010/main" xmlns:p15="http://schemas.microsoft.com/office/powerpoint/2012/main" xmlns:mc="http://schemas.openxmlformats.org/markup-compatibility/2006">
   <p:sldMasterIdLst>
     <p:sldMasterId id="2147483648" r:id="rId2"/>
   </p:sldMasterIdLst>
@@ -13,7 +13,7 @@
 </file>
 
 <file path=ppt/slideLayouts/slideLayout1.xml><?xml version="1.0" encoding="utf-8"?>
-<p:sldLayout xmlns:a="http://schemas.openxmlformats.org/drawingml/2006/main" xmlns:p="http://schemas.openxmlformats.org/presentationml/2006/main" xmlns:r="http://schemas.openxmlformats.org/officeDocument/2006/relationships" type="blank" preserve="1">
+<p:sldLayout xmlns:a="http://schemas.openxmlformats.org/drawingml/2006/main" xmlns:p="http://schemas.openxmlformats.org/presentationml/2006/main" xmlns:r="http://schemas.openxmlformats.org/officeDocument/2006/relationships" xmlns:p14="http://schemas.microsoft.com/office/powerpoint/2010/main" xmlns:p15="http://schemas.microsoft.com/office/powerpoint/2012/main" xmlns:mc="http://schemas.openxmlformats.org/markup-compatibility/2006" type="blank" preserve="1">
   <p:cSld name="Blank Slide">
     <p:spTree>
       <p:nvGrpSpPr>
@@ -35,7 +35,7 @@
 </file>
 
 <file path=ppt/slideLayouts/slideLayout10.xml><?xml version="1.0" encoding="utf-8"?>
-<p:sldLayout xmlns:a="http://schemas.openxmlformats.org/drawingml/2006/main" xmlns:p="http://schemas.openxmlformats.org/presentationml/2006/main" xmlns:r="http://schemas.openxmlformats.org/officeDocument/2006/relationships" type="objOverTx" preserve="1">
+<p:sldLayout xmlns:a="http://schemas.openxmlformats.org/drawingml/2006/main" xmlns:p="http://schemas.openxmlformats.org/presentationml/2006/main" xmlns:r="http://schemas.openxmlformats.org/officeDocument/2006/relationships" xmlns:p14="http://schemas.microsoft.com/office/powerpoint/2010/main" xmlns:p15="http://schemas.microsoft.com/office/powerpoint/2012/main" xmlns:mc="http://schemas.openxmlformats.org/markup-compatibility/2006" type="objOverTx" preserve="1">
   <p:cSld name="Title, Content over Content">
     <p:spTree>
       <p:nvGrpSpPr>
@@ -64,7 +64,7 @@
         <p:spPr>
           <a:xfrm>
             <a:off x="2139480" y="1207440"/>
-            <a:ext cx="38514240" cy="5054400"/>
+            <a:ext cx="38514240" cy="5054040"/>
           </a:xfrm>
           <a:prstGeom prst="rect">
             <a:avLst/>
@@ -74,7 +74,17 @@
           <a:bodyPr lIns="0" rIns="0" tIns="0" bIns="0" anchor="ctr"/>
           <a:p>
             <a:pPr algn="ctr"/>
-            <a:endParaRPr/>
+            <a:endParaRPr b="0" lang="en-IN" sz="4400" spc="-1" strike="noStrike">
+              <a:solidFill>
+                <a:srgbClr val="000000"/>
+              </a:solidFill>
+              <a:uFill>
+                <a:solidFill>
+                  <a:srgbClr val="ffffff"/>
+                </a:solidFill>
+              </a:uFill>
+              <a:latin typeface="Arial"/>
+            </a:endParaRPr>
           </a:p>
         </p:txBody>
       </p:sp>
@@ -100,7 +110,17 @@
         <p:txBody>
           <a:bodyPr lIns="0" rIns="0" tIns="0" bIns="0"/>
           <a:p>
-            <a:endParaRPr/>
+            <a:endParaRPr b="0" lang="en-IN" sz="3200" spc="-1" strike="noStrike">
+              <a:solidFill>
+                <a:srgbClr val="000000"/>
+              </a:solidFill>
+              <a:uFill>
+                <a:solidFill>
+                  <a:srgbClr val="ffffff"/>
+                </a:solidFill>
+              </a:uFill>
+              <a:latin typeface="Arial"/>
+            </a:endParaRPr>
           </a:p>
         </p:txBody>
       </p:sp>
@@ -126,7 +146,17 @@
         <p:txBody>
           <a:bodyPr lIns="0" rIns="0" tIns="0" bIns="0"/>
           <a:p>
-            <a:endParaRPr/>
+            <a:endParaRPr b="0" lang="en-IN" sz="3200" spc="-1" strike="noStrike">
+              <a:solidFill>
+                <a:srgbClr val="000000"/>
+              </a:solidFill>
+              <a:uFill>
+                <a:solidFill>
+                  <a:srgbClr val="ffffff"/>
+                </a:solidFill>
+              </a:uFill>
+              <a:latin typeface="Arial"/>
+            </a:endParaRPr>
           </a:p>
         </p:txBody>
       </p:sp>
@@ -136,7 +166,7 @@
 </file>
 
 <file path=ppt/slideLayouts/slideLayout11.xml><?xml version="1.0" encoding="utf-8"?>
-<p:sldLayout xmlns:a="http://schemas.openxmlformats.org/drawingml/2006/main" xmlns:p="http://schemas.openxmlformats.org/presentationml/2006/main" xmlns:r="http://schemas.openxmlformats.org/officeDocument/2006/relationships" type="fourObj" preserve="1">
+<p:sldLayout xmlns:a="http://schemas.openxmlformats.org/drawingml/2006/main" xmlns:p="http://schemas.openxmlformats.org/presentationml/2006/main" xmlns:r="http://schemas.openxmlformats.org/officeDocument/2006/relationships" xmlns:p14="http://schemas.microsoft.com/office/powerpoint/2010/main" xmlns:p15="http://schemas.microsoft.com/office/powerpoint/2012/main" xmlns:mc="http://schemas.openxmlformats.org/markup-compatibility/2006" type="fourObj" preserve="1">
   <p:cSld name="Title, 4 Content">
     <p:spTree>
       <p:nvGrpSpPr>
@@ -165,7 +195,7 @@
         <p:spPr>
           <a:xfrm>
             <a:off x="2139480" y="1207440"/>
-            <a:ext cx="38514240" cy="5054400"/>
+            <a:ext cx="38514240" cy="5054040"/>
           </a:xfrm>
           <a:prstGeom prst="rect">
             <a:avLst/>
@@ -175,7 +205,17 @@
           <a:bodyPr lIns="0" rIns="0" tIns="0" bIns="0" anchor="ctr"/>
           <a:p>
             <a:pPr algn="ctr"/>
-            <a:endParaRPr/>
+            <a:endParaRPr b="0" lang="en-IN" sz="4400" spc="-1" strike="noStrike">
+              <a:solidFill>
+                <a:srgbClr val="000000"/>
+              </a:solidFill>
+              <a:uFill>
+                <a:solidFill>
+                  <a:srgbClr val="ffffff"/>
+                </a:solidFill>
+              </a:uFill>
+              <a:latin typeface="Arial"/>
+            </a:endParaRPr>
           </a:p>
         </p:txBody>
       </p:sp>
@@ -201,7 +241,17 @@
         <p:txBody>
           <a:bodyPr lIns="0" rIns="0" tIns="0" bIns="0"/>
           <a:p>
-            <a:endParaRPr/>
+            <a:endParaRPr b="0" lang="en-IN" sz="3200" spc="-1" strike="noStrike">
+              <a:solidFill>
+                <a:srgbClr val="000000"/>
+              </a:solidFill>
+              <a:uFill>
+                <a:solidFill>
+                  <a:srgbClr val="ffffff"/>
+                </a:solidFill>
+              </a:uFill>
+              <a:latin typeface="Arial"/>
+            </a:endParaRPr>
           </a:p>
         </p:txBody>
       </p:sp>
@@ -227,7 +277,17 @@
         <p:txBody>
           <a:bodyPr lIns="0" rIns="0" tIns="0" bIns="0"/>
           <a:p>
-            <a:endParaRPr/>
+            <a:endParaRPr b="0" lang="en-IN" sz="3200" spc="-1" strike="noStrike">
+              <a:solidFill>
+                <a:srgbClr val="000000"/>
+              </a:solidFill>
+              <a:uFill>
+                <a:solidFill>
+                  <a:srgbClr val="ffffff"/>
+                </a:solidFill>
+              </a:uFill>
+              <a:latin typeface="Arial"/>
+            </a:endParaRPr>
           </a:p>
         </p:txBody>
       </p:sp>
@@ -253,7 +313,17 @@
         <p:txBody>
           <a:bodyPr lIns="0" rIns="0" tIns="0" bIns="0"/>
           <a:p>
-            <a:endParaRPr/>
+            <a:endParaRPr b="0" lang="en-IN" sz="3200" spc="-1" strike="noStrike">
+              <a:solidFill>
+                <a:srgbClr val="000000"/>
+              </a:solidFill>
+              <a:uFill>
+                <a:solidFill>
+                  <a:srgbClr val="ffffff"/>
+                </a:solidFill>
+              </a:uFill>
+              <a:latin typeface="Arial"/>
+            </a:endParaRPr>
           </a:p>
         </p:txBody>
       </p:sp>
@@ -279,7 +349,17 @@
         <p:txBody>
           <a:bodyPr lIns="0" rIns="0" tIns="0" bIns="0"/>
           <a:p>
-            <a:endParaRPr/>
+            <a:endParaRPr b="0" lang="en-IN" sz="3200" spc="-1" strike="noStrike">
+              <a:solidFill>
+                <a:srgbClr val="000000"/>
+              </a:solidFill>
+              <a:uFill>
+                <a:solidFill>
+                  <a:srgbClr val="ffffff"/>
+                </a:solidFill>
+              </a:uFill>
+              <a:latin typeface="Arial"/>
+            </a:endParaRPr>
           </a:p>
         </p:txBody>
       </p:sp>
@@ -289,7 +369,7 @@
 </file>
 
 <file path=ppt/slideLayouts/slideLayout12.xml><?xml version="1.0" encoding="utf-8"?>
-<p:sldLayout xmlns:a="http://schemas.openxmlformats.org/drawingml/2006/main" xmlns:p="http://schemas.openxmlformats.org/presentationml/2006/main" xmlns:r="http://schemas.openxmlformats.org/officeDocument/2006/relationships" type="blank" preserve="1">
+<p:sldLayout xmlns:a="http://schemas.openxmlformats.org/drawingml/2006/main" xmlns:p="http://schemas.openxmlformats.org/presentationml/2006/main" xmlns:r="http://schemas.openxmlformats.org/officeDocument/2006/relationships" xmlns:p14="http://schemas.microsoft.com/office/powerpoint/2010/main" xmlns:p15="http://schemas.microsoft.com/office/powerpoint/2012/main" xmlns:mc="http://schemas.openxmlformats.org/markup-compatibility/2006" type="blank" preserve="1">
   <p:cSld name="Title, 6 Content">
     <p:spTree>
       <p:nvGrpSpPr>
@@ -318,7 +398,7 @@
         <p:spPr>
           <a:xfrm>
             <a:off x="2139480" y="1207440"/>
-            <a:ext cx="38514240" cy="5054400"/>
+            <a:ext cx="38514240" cy="5054040"/>
           </a:xfrm>
           <a:prstGeom prst="rect">
             <a:avLst/>
@@ -328,7 +408,17 @@
           <a:bodyPr lIns="0" rIns="0" tIns="0" bIns="0" anchor="ctr"/>
           <a:p>
             <a:pPr algn="ctr"/>
-            <a:endParaRPr/>
+            <a:endParaRPr b="0" lang="en-IN" sz="4400" spc="-1" strike="noStrike">
+              <a:solidFill>
+                <a:srgbClr val="000000"/>
+              </a:solidFill>
+              <a:uFill>
+                <a:solidFill>
+                  <a:srgbClr val="ffffff"/>
+                </a:solidFill>
+              </a:uFill>
+              <a:latin typeface="Arial"/>
+            </a:endParaRPr>
           </a:p>
         </p:txBody>
       </p:sp>
@@ -354,7 +444,17 @@
         <p:txBody>
           <a:bodyPr lIns="0" rIns="0" tIns="0" bIns="0"/>
           <a:p>
-            <a:endParaRPr/>
+            <a:endParaRPr b="0" lang="en-IN" sz="3200" spc="-1" strike="noStrike">
+              <a:solidFill>
+                <a:srgbClr val="000000"/>
+              </a:solidFill>
+              <a:uFill>
+                <a:solidFill>
+                  <a:srgbClr val="ffffff"/>
+                </a:solidFill>
+              </a:uFill>
+              <a:latin typeface="Arial"/>
+            </a:endParaRPr>
           </a:p>
         </p:txBody>
       </p:sp>
@@ -380,7 +480,17 @@
         <p:txBody>
           <a:bodyPr lIns="0" rIns="0" tIns="0" bIns="0"/>
           <a:p>
-            <a:endParaRPr/>
+            <a:endParaRPr b="0" lang="en-IN" sz="3200" spc="-1" strike="noStrike">
+              <a:solidFill>
+                <a:srgbClr val="000000"/>
+              </a:solidFill>
+              <a:uFill>
+                <a:solidFill>
+                  <a:srgbClr val="ffffff"/>
+                </a:solidFill>
+              </a:uFill>
+              <a:latin typeface="Arial"/>
+            </a:endParaRPr>
           </a:p>
         </p:txBody>
       </p:sp>
@@ -392,9 +502,7 @@
         </p:nvPicPr>
         <p:blipFill>
           <a:blip r:embed="rId2"/>
-          <a:stretch>
-            <a:fillRect/>
-          </a:stretch>
+          <a:stretch/>
         </p:blipFill>
         <p:spPr>
           <a:xfrm>
@@ -417,9 +525,7 @@
         </p:nvPicPr>
         <p:blipFill>
           <a:blip r:embed="rId3"/>
-          <a:stretch>
-            <a:fillRect/>
-          </a:stretch>
+          <a:stretch/>
         </p:blipFill>
         <p:spPr>
           <a:xfrm>
@@ -440,7 +546,7 @@
 </file>
 
 <file path=ppt/slideLayouts/slideLayout2.xml><?xml version="1.0" encoding="utf-8"?>
-<p:sldLayout xmlns:a="http://schemas.openxmlformats.org/drawingml/2006/main" xmlns:p="http://schemas.openxmlformats.org/presentationml/2006/main" xmlns:r="http://schemas.openxmlformats.org/officeDocument/2006/relationships" type="tx" preserve="1">
+<p:sldLayout xmlns:a="http://schemas.openxmlformats.org/drawingml/2006/main" xmlns:p="http://schemas.openxmlformats.org/presentationml/2006/main" xmlns:r="http://schemas.openxmlformats.org/officeDocument/2006/relationships" xmlns:p14="http://schemas.microsoft.com/office/powerpoint/2010/main" xmlns:p15="http://schemas.microsoft.com/office/powerpoint/2012/main" xmlns:mc="http://schemas.openxmlformats.org/markup-compatibility/2006" type="tx" preserve="1">
   <p:cSld name="Title Slide">
     <p:spTree>
       <p:nvGrpSpPr>
@@ -469,7 +575,7 @@
         <p:spPr>
           <a:xfrm>
             <a:off x="2139480" y="1207440"/>
-            <a:ext cx="38514240" cy="5054400"/>
+            <a:ext cx="38514240" cy="5054040"/>
           </a:xfrm>
           <a:prstGeom prst="rect">
             <a:avLst/>
@@ -479,7 +585,17 @@
           <a:bodyPr lIns="0" rIns="0" tIns="0" bIns="0" anchor="ctr"/>
           <a:p>
             <a:pPr algn="ctr"/>
-            <a:endParaRPr/>
+            <a:endParaRPr b="0" lang="en-IN" sz="4400" spc="-1" strike="noStrike">
+              <a:solidFill>
+                <a:srgbClr val="000000"/>
+              </a:solidFill>
+              <a:uFill>
+                <a:solidFill>
+                  <a:srgbClr val="ffffff"/>
+                </a:solidFill>
+              </a:uFill>
+              <a:latin typeface="Arial"/>
+            </a:endParaRPr>
           </a:p>
         </p:txBody>
       </p:sp>
@@ -496,7 +612,7 @@
         <p:spPr>
           <a:xfrm>
             <a:off x="2139480" y="7082280"/>
-            <a:ext cx="38514240" cy="17555040"/>
+            <a:ext cx="38514240" cy="17554680"/>
           </a:xfrm>
           <a:prstGeom prst="rect">
             <a:avLst/>
@@ -506,7 +622,17 @@
           <a:bodyPr lIns="0" rIns="0" tIns="0" bIns="0" anchor="ctr"/>
           <a:p>
             <a:pPr algn="ctr"/>
-            <a:endParaRPr/>
+            <a:endParaRPr b="0" lang="en-IN" sz="3200" spc="-1" strike="noStrike">
+              <a:solidFill>
+                <a:srgbClr val="000000"/>
+              </a:solidFill>
+              <a:uFill>
+                <a:solidFill>
+                  <a:srgbClr val="ffffff"/>
+                </a:solidFill>
+              </a:uFill>
+              <a:latin typeface="Arial"/>
+            </a:endParaRPr>
           </a:p>
         </p:txBody>
       </p:sp>
@@ -516,7 +642,7 @@
 </file>
 
 <file path=ppt/slideLayouts/slideLayout3.xml><?xml version="1.0" encoding="utf-8"?>
-<p:sldLayout xmlns:a="http://schemas.openxmlformats.org/drawingml/2006/main" xmlns:p="http://schemas.openxmlformats.org/presentationml/2006/main" xmlns:r="http://schemas.openxmlformats.org/officeDocument/2006/relationships" type="obj" preserve="1">
+<p:sldLayout xmlns:a="http://schemas.openxmlformats.org/drawingml/2006/main" xmlns:p="http://schemas.openxmlformats.org/presentationml/2006/main" xmlns:r="http://schemas.openxmlformats.org/officeDocument/2006/relationships" xmlns:p14="http://schemas.microsoft.com/office/powerpoint/2010/main" xmlns:p15="http://schemas.microsoft.com/office/powerpoint/2012/main" xmlns:mc="http://schemas.openxmlformats.org/markup-compatibility/2006" type="obj" preserve="1">
   <p:cSld name="Title, Content">
     <p:spTree>
       <p:nvGrpSpPr>
@@ -545,7 +671,7 @@
         <p:spPr>
           <a:xfrm>
             <a:off x="2139480" y="1207440"/>
-            <a:ext cx="38514240" cy="5054400"/>
+            <a:ext cx="38514240" cy="5054040"/>
           </a:xfrm>
           <a:prstGeom prst="rect">
             <a:avLst/>
@@ -555,7 +681,17 @@
           <a:bodyPr lIns="0" rIns="0" tIns="0" bIns="0" anchor="ctr"/>
           <a:p>
             <a:pPr algn="ctr"/>
-            <a:endParaRPr/>
+            <a:endParaRPr b="0" lang="en-IN" sz="4400" spc="-1" strike="noStrike">
+              <a:solidFill>
+                <a:srgbClr val="000000"/>
+              </a:solidFill>
+              <a:uFill>
+                <a:solidFill>
+                  <a:srgbClr val="ffffff"/>
+                </a:solidFill>
+              </a:uFill>
+              <a:latin typeface="Arial"/>
+            </a:endParaRPr>
           </a:p>
         </p:txBody>
       </p:sp>
@@ -581,7 +717,17 @@
         <p:txBody>
           <a:bodyPr lIns="0" rIns="0" tIns="0" bIns="0"/>
           <a:p>
-            <a:endParaRPr/>
+            <a:endParaRPr b="0" lang="en-IN" sz="3200" spc="-1" strike="noStrike">
+              <a:solidFill>
+                <a:srgbClr val="000000"/>
+              </a:solidFill>
+              <a:uFill>
+                <a:solidFill>
+                  <a:srgbClr val="ffffff"/>
+                </a:solidFill>
+              </a:uFill>
+              <a:latin typeface="Arial"/>
+            </a:endParaRPr>
           </a:p>
         </p:txBody>
       </p:sp>
@@ -591,7 +737,7 @@
 </file>
 
 <file path=ppt/slideLayouts/slideLayout4.xml><?xml version="1.0" encoding="utf-8"?>
-<p:sldLayout xmlns:a="http://schemas.openxmlformats.org/drawingml/2006/main" xmlns:p="http://schemas.openxmlformats.org/presentationml/2006/main" xmlns:r="http://schemas.openxmlformats.org/officeDocument/2006/relationships" type="twoObj" preserve="1">
+<p:sldLayout xmlns:a="http://schemas.openxmlformats.org/drawingml/2006/main" xmlns:p="http://schemas.openxmlformats.org/presentationml/2006/main" xmlns:r="http://schemas.openxmlformats.org/officeDocument/2006/relationships" xmlns:p14="http://schemas.microsoft.com/office/powerpoint/2010/main" xmlns:p15="http://schemas.microsoft.com/office/powerpoint/2012/main" xmlns:mc="http://schemas.openxmlformats.org/markup-compatibility/2006" type="twoObj" preserve="1">
   <p:cSld name="Title, 2 Content">
     <p:spTree>
       <p:nvGrpSpPr>
@@ -620,7 +766,7 @@
         <p:spPr>
           <a:xfrm>
             <a:off x="2139480" y="1207440"/>
-            <a:ext cx="38514240" cy="5054400"/>
+            <a:ext cx="38514240" cy="5054040"/>
           </a:xfrm>
           <a:prstGeom prst="rect">
             <a:avLst/>
@@ -630,7 +776,17 @@
           <a:bodyPr lIns="0" rIns="0" tIns="0" bIns="0" anchor="ctr"/>
           <a:p>
             <a:pPr algn="ctr"/>
-            <a:endParaRPr/>
+            <a:endParaRPr b="0" lang="en-IN" sz="4400" spc="-1" strike="noStrike">
+              <a:solidFill>
+                <a:srgbClr val="000000"/>
+              </a:solidFill>
+              <a:uFill>
+                <a:solidFill>
+                  <a:srgbClr val="ffffff"/>
+                </a:solidFill>
+              </a:uFill>
+              <a:latin typeface="Arial"/>
+            </a:endParaRPr>
           </a:p>
         </p:txBody>
       </p:sp>
@@ -656,7 +812,17 @@
         <p:txBody>
           <a:bodyPr lIns="0" rIns="0" tIns="0" bIns="0"/>
           <a:p>
-            <a:endParaRPr/>
+            <a:endParaRPr b="0" lang="en-IN" sz="3200" spc="-1" strike="noStrike">
+              <a:solidFill>
+                <a:srgbClr val="000000"/>
+              </a:solidFill>
+              <a:uFill>
+                <a:solidFill>
+                  <a:srgbClr val="ffffff"/>
+                </a:solidFill>
+              </a:uFill>
+              <a:latin typeface="Arial"/>
+            </a:endParaRPr>
           </a:p>
         </p:txBody>
       </p:sp>
@@ -682,7 +848,17 @@
         <p:txBody>
           <a:bodyPr lIns="0" rIns="0" tIns="0" bIns="0"/>
           <a:p>
-            <a:endParaRPr/>
+            <a:endParaRPr b="0" lang="en-IN" sz="3200" spc="-1" strike="noStrike">
+              <a:solidFill>
+                <a:srgbClr val="000000"/>
+              </a:solidFill>
+              <a:uFill>
+                <a:solidFill>
+                  <a:srgbClr val="ffffff"/>
+                </a:solidFill>
+              </a:uFill>
+              <a:latin typeface="Arial"/>
+            </a:endParaRPr>
           </a:p>
         </p:txBody>
       </p:sp>
@@ -692,7 +868,7 @@
 </file>
 
 <file path=ppt/slideLayouts/slideLayout5.xml><?xml version="1.0" encoding="utf-8"?>
-<p:sldLayout xmlns:a="http://schemas.openxmlformats.org/drawingml/2006/main" xmlns:p="http://schemas.openxmlformats.org/presentationml/2006/main" xmlns:r="http://schemas.openxmlformats.org/officeDocument/2006/relationships" type="titleOnly" preserve="1">
+<p:sldLayout xmlns:a="http://schemas.openxmlformats.org/drawingml/2006/main" xmlns:p="http://schemas.openxmlformats.org/presentationml/2006/main" xmlns:r="http://schemas.openxmlformats.org/officeDocument/2006/relationships" xmlns:p14="http://schemas.microsoft.com/office/powerpoint/2010/main" xmlns:p15="http://schemas.microsoft.com/office/powerpoint/2012/main" xmlns:mc="http://schemas.openxmlformats.org/markup-compatibility/2006" type="titleOnly" preserve="1">
   <p:cSld name="Title Only">
     <p:spTree>
       <p:nvGrpSpPr>
@@ -721,7 +897,7 @@
         <p:spPr>
           <a:xfrm>
             <a:off x="2139480" y="1207440"/>
-            <a:ext cx="38514240" cy="5054400"/>
+            <a:ext cx="38514240" cy="5054040"/>
           </a:xfrm>
           <a:prstGeom prst="rect">
             <a:avLst/>
@@ -731,7 +907,17 @@
           <a:bodyPr lIns="0" rIns="0" tIns="0" bIns="0" anchor="ctr"/>
           <a:p>
             <a:pPr algn="ctr"/>
-            <a:endParaRPr/>
+            <a:endParaRPr b="0" lang="en-IN" sz="4400" spc="-1" strike="noStrike">
+              <a:solidFill>
+                <a:srgbClr val="000000"/>
+              </a:solidFill>
+              <a:uFill>
+                <a:solidFill>
+                  <a:srgbClr val="ffffff"/>
+                </a:solidFill>
+              </a:uFill>
+              <a:latin typeface="Arial"/>
+            </a:endParaRPr>
           </a:p>
         </p:txBody>
       </p:sp>
@@ -741,7 +927,7 @@
 </file>
 
 <file path=ppt/slideLayouts/slideLayout6.xml><?xml version="1.0" encoding="utf-8"?>
-<p:sldLayout xmlns:a="http://schemas.openxmlformats.org/drawingml/2006/main" xmlns:p="http://schemas.openxmlformats.org/presentationml/2006/main" xmlns:r="http://schemas.openxmlformats.org/officeDocument/2006/relationships" type="objOnly" preserve="1">
+<p:sldLayout xmlns:a="http://schemas.openxmlformats.org/drawingml/2006/main" xmlns:p="http://schemas.openxmlformats.org/presentationml/2006/main" xmlns:r="http://schemas.openxmlformats.org/officeDocument/2006/relationships" xmlns:p14="http://schemas.microsoft.com/office/powerpoint/2010/main" xmlns:p15="http://schemas.microsoft.com/office/powerpoint/2012/main" xmlns:mc="http://schemas.openxmlformats.org/markup-compatibility/2006" type="objOnly" preserve="1">
   <p:cSld name="Centered Text">
     <p:spTree>
       <p:nvGrpSpPr>
@@ -770,7 +956,7 @@
         <p:spPr>
           <a:xfrm>
             <a:off x="2139480" y="1207440"/>
-            <a:ext cx="38514240" cy="23429160"/>
+            <a:ext cx="38514240" cy="23428800"/>
           </a:xfrm>
           <a:prstGeom prst="rect">
             <a:avLst/>
@@ -780,7 +966,17 @@
           <a:bodyPr lIns="0" rIns="0" tIns="0" bIns="0" anchor="ctr"/>
           <a:p>
             <a:pPr algn="ctr"/>
-            <a:endParaRPr/>
+            <a:endParaRPr b="0" lang="en-IN" sz="3200" spc="-1" strike="noStrike">
+              <a:solidFill>
+                <a:srgbClr val="000000"/>
+              </a:solidFill>
+              <a:uFill>
+                <a:solidFill>
+                  <a:srgbClr val="ffffff"/>
+                </a:solidFill>
+              </a:uFill>
+              <a:latin typeface="Arial"/>
+            </a:endParaRPr>
           </a:p>
         </p:txBody>
       </p:sp>
@@ -790,7 +986,7 @@
 </file>
 
 <file path=ppt/slideLayouts/slideLayout7.xml><?xml version="1.0" encoding="utf-8"?>
-<p:sldLayout xmlns:a="http://schemas.openxmlformats.org/drawingml/2006/main" xmlns:p="http://schemas.openxmlformats.org/presentationml/2006/main" xmlns:r="http://schemas.openxmlformats.org/officeDocument/2006/relationships" type="twoObjAndObj" preserve="1">
+<p:sldLayout xmlns:a="http://schemas.openxmlformats.org/drawingml/2006/main" xmlns:p="http://schemas.openxmlformats.org/presentationml/2006/main" xmlns:r="http://schemas.openxmlformats.org/officeDocument/2006/relationships" xmlns:p14="http://schemas.microsoft.com/office/powerpoint/2010/main" xmlns:p15="http://schemas.microsoft.com/office/powerpoint/2012/main" xmlns:mc="http://schemas.openxmlformats.org/markup-compatibility/2006" type="twoObjAndObj" preserve="1">
   <p:cSld name="Title, 2 Content and Content">
     <p:spTree>
       <p:nvGrpSpPr>
@@ -819,7 +1015,7 @@
         <p:spPr>
           <a:xfrm>
             <a:off x="2139480" y="1207440"/>
-            <a:ext cx="38514240" cy="5054400"/>
+            <a:ext cx="38514240" cy="5054040"/>
           </a:xfrm>
           <a:prstGeom prst="rect">
             <a:avLst/>
@@ -829,7 +1025,17 @@
           <a:bodyPr lIns="0" rIns="0" tIns="0" bIns="0" anchor="ctr"/>
           <a:p>
             <a:pPr algn="ctr"/>
-            <a:endParaRPr/>
+            <a:endParaRPr b="0" lang="en-IN" sz="4400" spc="-1" strike="noStrike">
+              <a:solidFill>
+                <a:srgbClr val="000000"/>
+              </a:solidFill>
+              <a:uFill>
+                <a:solidFill>
+                  <a:srgbClr val="ffffff"/>
+                </a:solidFill>
+              </a:uFill>
+              <a:latin typeface="Arial"/>
+            </a:endParaRPr>
           </a:p>
         </p:txBody>
       </p:sp>
@@ -855,7 +1061,17 @@
         <p:txBody>
           <a:bodyPr lIns="0" rIns="0" tIns="0" bIns="0"/>
           <a:p>
-            <a:endParaRPr/>
+            <a:endParaRPr b="0" lang="en-IN" sz="3200" spc="-1" strike="noStrike">
+              <a:solidFill>
+                <a:srgbClr val="000000"/>
+              </a:solidFill>
+              <a:uFill>
+                <a:solidFill>
+                  <a:srgbClr val="ffffff"/>
+                </a:solidFill>
+              </a:uFill>
+              <a:latin typeface="Arial"/>
+            </a:endParaRPr>
           </a:p>
         </p:txBody>
       </p:sp>
@@ -881,7 +1097,17 @@
         <p:txBody>
           <a:bodyPr lIns="0" rIns="0" tIns="0" bIns="0"/>
           <a:p>
-            <a:endParaRPr/>
+            <a:endParaRPr b="0" lang="en-IN" sz="3200" spc="-1" strike="noStrike">
+              <a:solidFill>
+                <a:srgbClr val="000000"/>
+              </a:solidFill>
+              <a:uFill>
+                <a:solidFill>
+                  <a:srgbClr val="ffffff"/>
+                </a:solidFill>
+              </a:uFill>
+              <a:latin typeface="Arial"/>
+            </a:endParaRPr>
           </a:p>
         </p:txBody>
       </p:sp>
@@ -907,7 +1133,17 @@
         <p:txBody>
           <a:bodyPr lIns="0" rIns="0" tIns="0" bIns="0"/>
           <a:p>
-            <a:endParaRPr/>
+            <a:endParaRPr b="0" lang="en-IN" sz="3200" spc="-1" strike="noStrike">
+              <a:solidFill>
+                <a:srgbClr val="000000"/>
+              </a:solidFill>
+              <a:uFill>
+                <a:solidFill>
+                  <a:srgbClr val="ffffff"/>
+                </a:solidFill>
+              </a:uFill>
+              <a:latin typeface="Arial"/>
+            </a:endParaRPr>
           </a:p>
         </p:txBody>
       </p:sp>
@@ -917,7 +1153,7 @@
 </file>
 
 <file path=ppt/slideLayouts/slideLayout8.xml><?xml version="1.0" encoding="utf-8"?>
-<p:sldLayout xmlns:a="http://schemas.openxmlformats.org/drawingml/2006/main" xmlns:p="http://schemas.openxmlformats.org/presentationml/2006/main" xmlns:r="http://schemas.openxmlformats.org/officeDocument/2006/relationships" type="objAndTwoObj" preserve="1">
+<p:sldLayout xmlns:a="http://schemas.openxmlformats.org/drawingml/2006/main" xmlns:p="http://schemas.openxmlformats.org/presentationml/2006/main" xmlns:r="http://schemas.openxmlformats.org/officeDocument/2006/relationships" xmlns:p14="http://schemas.microsoft.com/office/powerpoint/2010/main" xmlns:p15="http://schemas.microsoft.com/office/powerpoint/2012/main" xmlns:mc="http://schemas.openxmlformats.org/markup-compatibility/2006" type="objAndTwoObj" preserve="1">
   <p:cSld name="Title Content and 2 Content">
     <p:spTree>
       <p:nvGrpSpPr>
@@ -946,7 +1182,7 @@
         <p:spPr>
           <a:xfrm>
             <a:off x="2139480" y="1207440"/>
-            <a:ext cx="38514240" cy="5054400"/>
+            <a:ext cx="38514240" cy="5054040"/>
           </a:xfrm>
           <a:prstGeom prst="rect">
             <a:avLst/>
@@ -956,7 +1192,17 @@
           <a:bodyPr lIns="0" rIns="0" tIns="0" bIns="0" anchor="ctr"/>
           <a:p>
             <a:pPr algn="ctr"/>
-            <a:endParaRPr/>
+            <a:endParaRPr b="0" lang="en-IN" sz="4400" spc="-1" strike="noStrike">
+              <a:solidFill>
+                <a:srgbClr val="000000"/>
+              </a:solidFill>
+              <a:uFill>
+                <a:solidFill>
+                  <a:srgbClr val="ffffff"/>
+                </a:solidFill>
+              </a:uFill>
+              <a:latin typeface="Arial"/>
+            </a:endParaRPr>
           </a:p>
         </p:txBody>
       </p:sp>
@@ -982,7 +1228,17 @@
         <p:txBody>
           <a:bodyPr lIns="0" rIns="0" tIns="0" bIns="0"/>
           <a:p>
-            <a:endParaRPr/>
+            <a:endParaRPr b="0" lang="en-IN" sz="3200" spc="-1" strike="noStrike">
+              <a:solidFill>
+                <a:srgbClr val="000000"/>
+              </a:solidFill>
+              <a:uFill>
+                <a:solidFill>
+                  <a:srgbClr val="ffffff"/>
+                </a:solidFill>
+              </a:uFill>
+              <a:latin typeface="Arial"/>
+            </a:endParaRPr>
           </a:p>
         </p:txBody>
       </p:sp>
@@ -1008,7 +1264,17 @@
         <p:txBody>
           <a:bodyPr lIns="0" rIns="0" tIns="0" bIns="0"/>
           <a:p>
-            <a:endParaRPr/>
+            <a:endParaRPr b="0" lang="en-IN" sz="3200" spc="-1" strike="noStrike">
+              <a:solidFill>
+                <a:srgbClr val="000000"/>
+              </a:solidFill>
+              <a:uFill>
+                <a:solidFill>
+                  <a:srgbClr val="ffffff"/>
+                </a:solidFill>
+              </a:uFill>
+              <a:latin typeface="Arial"/>
+            </a:endParaRPr>
           </a:p>
         </p:txBody>
       </p:sp>
@@ -1034,7 +1300,17 @@
         <p:txBody>
           <a:bodyPr lIns="0" rIns="0" tIns="0" bIns="0"/>
           <a:p>
-            <a:endParaRPr/>
+            <a:endParaRPr b="0" lang="en-IN" sz="3200" spc="-1" strike="noStrike">
+              <a:solidFill>
+                <a:srgbClr val="000000"/>
+              </a:solidFill>
+              <a:uFill>
+                <a:solidFill>
+                  <a:srgbClr val="ffffff"/>
+                </a:solidFill>
+              </a:uFill>
+              <a:latin typeface="Arial"/>
+            </a:endParaRPr>
           </a:p>
         </p:txBody>
       </p:sp>
@@ -1044,7 +1320,7 @@
 </file>
 
 <file path=ppt/slideLayouts/slideLayout9.xml><?xml version="1.0" encoding="utf-8"?>
-<p:sldLayout xmlns:a="http://schemas.openxmlformats.org/drawingml/2006/main" xmlns:p="http://schemas.openxmlformats.org/presentationml/2006/main" xmlns:r="http://schemas.openxmlformats.org/officeDocument/2006/relationships" type="twoObjOverTx" preserve="1">
+<p:sldLayout xmlns:a="http://schemas.openxmlformats.org/drawingml/2006/main" xmlns:p="http://schemas.openxmlformats.org/presentationml/2006/main" xmlns:r="http://schemas.openxmlformats.org/officeDocument/2006/relationships" xmlns:p14="http://schemas.microsoft.com/office/powerpoint/2010/main" xmlns:p15="http://schemas.microsoft.com/office/powerpoint/2012/main" xmlns:mc="http://schemas.openxmlformats.org/markup-compatibility/2006" type="twoObjOverTx" preserve="1">
   <p:cSld name="Title, 2 Content over Content">
     <p:spTree>
       <p:nvGrpSpPr>
@@ -1073,7 +1349,7 @@
         <p:spPr>
           <a:xfrm>
             <a:off x="2139480" y="1207440"/>
-            <a:ext cx="38514240" cy="5054400"/>
+            <a:ext cx="38514240" cy="5054040"/>
           </a:xfrm>
           <a:prstGeom prst="rect">
             <a:avLst/>
@@ -1083,7 +1359,17 @@
           <a:bodyPr lIns="0" rIns="0" tIns="0" bIns="0" anchor="ctr"/>
           <a:p>
             <a:pPr algn="ctr"/>
-            <a:endParaRPr/>
+            <a:endParaRPr b="0" lang="en-IN" sz="4400" spc="-1" strike="noStrike">
+              <a:solidFill>
+                <a:srgbClr val="000000"/>
+              </a:solidFill>
+              <a:uFill>
+                <a:solidFill>
+                  <a:srgbClr val="ffffff"/>
+                </a:solidFill>
+              </a:uFill>
+              <a:latin typeface="Arial"/>
+            </a:endParaRPr>
           </a:p>
         </p:txBody>
       </p:sp>
@@ -1109,7 +1395,17 @@
         <p:txBody>
           <a:bodyPr lIns="0" rIns="0" tIns="0" bIns="0"/>
           <a:p>
-            <a:endParaRPr/>
+            <a:endParaRPr b="0" lang="en-IN" sz="3200" spc="-1" strike="noStrike">
+              <a:solidFill>
+                <a:srgbClr val="000000"/>
+              </a:solidFill>
+              <a:uFill>
+                <a:solidFill>
+                  <a:srgbClr val="ffffff"/>
+                </a:solidFill>
+              </a:uFill>
+              <a:latin typeface="Arial"/>
+            </a:endParaRPr>
           </a:p>
         </p:txBody>
       </p:sp>
@@ -1135,7 +1431,17 @@
         <p:txBody>
           <a:bodyPr lIns="0" rIns="0" tIns="0" bIns="0"/>
           <a:p>
-            <a:endParaRPr/>
+            <a:endParaRPr b="0" lang="en-IN" sz="3200" spc="-1" strike="noStrike">
+              <a:solidFill>
+                <a:srgbClr val="000000"/>
+              </a:solidFill>
+              <a:uFill>
+                <a:solidFill>
+                  <a:srgbClr val="ffffff"/>
+                </a:solidFill>
+              </a:uFill>
+              <a:latin typeface="Arial"/>
+            </a:endParaRPr>
           </a:p>
         </p:txBody>
       </p:sp>
@@ -1161,7 +1467,17 @@
         <p:txBody>
           <a:bodyPr lIns="0" rIns="0" tIns="0" bIns="0"/>
           <a:p>
-            <a:endParaRPr/>
+            <a:endParaRPr b="0" lang="en-IN" sz="3200" spc="-1" strike="noStrike">
+              <a:solidFill>
+                <a:srgbClr val="000000"/>
+              </a:solidFill>
+              <a:uFill>
+                <a:solidFill>
+                  <a:srgbClr val="ffffff"/>
+                </a:solidFill>
+              </a:uFill>
+              <a:latin typeface="Arial"/>
+            </a:endParaRPr>
           </a:p>
         </p:txBody>
       </p:sp>
@@ -1171,7 +1487,7 @@
 </file>
 
 <file path=ppt/slideMasters/slideMaster1.xml><?xml version="1.0" encoding="utf-8"?>
-<p:sldMaster xmlns:a="http://schemas.openxmlformats.org/drawingml/2006/main" xmlns:p="http://schemas.openxmlformats.org/presentationml/2006/main" xmlns:r="http://schemas.openxmlformats.org/officeDocument/2006/relationships">
+<p:sldMaster xmlns:a="http://schemas.openxmlformats.org/drawingml/2006/main" xmlns:p="http://schemas.openxmlformats.org/presentationml/2006/main" xmlns:r="http://schemas.openxmlformats.org/officeDocument/2006/relationships" xmlns:p14="http://schemas.microsoft.com/office/powerpoint/2010/main" xmlns:p15="http://schemas.microsoft.com/office/powerpoint/2012/main" xmlns:mc="http://schemas.openxmlformats.org/markup-compatibility/2006">
   <p:cSld>
     <p:bg>
       <p:bgPr>
@@ -1202,14 +1518,12 @@
         </p:nvPicPr>
         <p:blipFill>
           <a:blip r:embed="rId2"/>
-          <a:stretch>
-            <a:fillRect/>
-          </a:stretch>
+          <a:stretch/>
         </p:blipFill>
         <p:spPr>
           <a:xfrm>
             <a:off x="720" y="0"/>
-            <a:ext cx="42791760" cy="30266280"/>
+            <a:ext cx="42792120" cy="30266640"/>
           </a:xfrm>
           <a:prstGeom prst="rect">
             <a:avLst/>
@@ -1243,12 +1557,30 @@
           <a:p>
             <a:pPr algn="ctr"/>
             <a:r>
-              <a:rPr lang="en-IN" sz="4400">
+              <a:rPr b="0" lang="en-IN" sz="4400" spc="-1" strike="noStrike">
+                <a:solidFill>
+                  <a:srgbClr val="000000"/>
+                </a:solidFill>
+                <a:uFill>
+                  <a:solidFill>
+                    <a:srgbClr val="ffffff"/>
+                  </a:solidFill>
+                </a:uFill>
                 <a:latin typeface="Arial"/>
               </a:rPr>
               <a:t>Click to edit the title text format</a:t>
             </a:r>
-            <a:endParaRPr/>
+            <a:endParaRPr b="0" lang="en-IN" sz="4400" spc="-1" strike="noStrike">
+              <a:solidFill>
+                <a:srgbClr val="000000"/>
+              </a:solidFill>
+              <a:uFill>
+                <a:solidFill>
+                  <a:srgbClr val="ffffff"/>
+                </a:solidFill>
+              </a:uFill>
+              <a:latin typeface="Arial"/>
+            </a:endParaRPr>
           </a:p>
         </p:txBody>
       </p:sp>
@@ -1274,102 +1606,249 @@
         <p:txBody>
           <a:bodyPr lIns="0" rIns="0" tIns="0" bIns="0"/>
           <a:p>
-            <a:pPr>
+            <a:pPr marL="432000" indent="-324000">
+              <a:buClr>
+                <a:srgbClr val="000000"/>
+              </a:buClr>
               <a:buSzPct val="45000"/>
-              <a:buFont typeface="StarSymbol"/>
+              <a:buFont typeface="Wingdings" charset="2"/>
               <a:buChar char=""/>
             </a:pPr>
             <a:r>
-              <a:rPr lang="en-IN" sz="3200">
+              <a:rPr b="0" lang="en-IN" sz="3200" spc="-1" strike="noStrike">
+                <a:solidFill>
+                  <a:srgbClr val="000000"/>
+                </a:solidFill>
+                <a:uFill>
+                  <a:solidFill>
+                    <a:srgbClr val="ffffff"/>
+                  </a:solidFill>
+                </a:uFill>
                 <a:latin typeface="Arial"/>
               </a:rPr>
               <a:t>Click to edit the outline text format</a:t>
             </a:r>
-            <a:endParaRPr/>
-          </a:p>
-          <a:p>
-            <a:pPr lvl="1">
+            <a:endParaRPr b="0" lang="en-IN" sz="3200" spc="-1" strike="noStrike">
+              <a:solidFill>
+                <a:srgbClr val="000000"/>
+              </a:solidFill>
+              <a:uFill>
+                <a:solidFill>
+                  <a:srgbClr val="ffffff"/>
+                </a:solidFill>
+              </a:uFill>
+              <a:latin typeface="Arial"/>
+            </a:endParaRPr>
+          </a:p>
+          <a:p>
+            <a:pPr lvl="1" marL="864000" indent="-324000">
+              <a:buClr>
+                <a:srgbClr val="000000"/>
+              </a:buClr>
               <a:buSzPct val="75000"/>
-              <a:buFont typeface="StarSymbol"/>
+              <a:buFont typeface="Symbol" charset="2"/>
               <a:buChar char=""/>
             </a:pPr>
             <a:r>
-              <a:rPr lang="en-IN" sz="2800">
+              <a:rPr b="0" lang="en-IN" sz="2800" spc="-1" strike="noStrike">
+                <a:solidFill>
+                  <a:srgbClr val="000000"/>
+                </a:solidFill>
+                <a:uFill>
+                  <a:solidFill>
+                    <a:srgbClr val="ffffff"/>
+                  </a:solidFill>
+                </a:uFill>
                 <a:latin typeface="Arial"/>
               </a:rPr>
               <a:t>Second Outline Level</a:t>
             </a:r>
-            <a:endParaRPr/>
-          </a:p>
-          <a:p>
-            <a:pPr lvl="2">
+            <a:endParaRPr b="0" lang="en-IN" sz="2800" spc="-1" strike="noStrike">
+              <a:solidFill>
+                <a:srgbClr val="000000"/>
+              </a:solidFill>
+              <a:uFill>
+                <a:solidFill>
+                  <a:srgbClr val="ffffff"/>
+                </a:solidFill>
+              </a:uFill>
+              <a:latin typeface="Arial"/>
+            </a:endParaRPr>
+          </a:p>
+          <a:p>
+            <a:pPr lvl="2" marL="1296000" indent="-288000">
+              <a:buClr>
+                <a:srgbClr val="000000"/>
+              </a:buClr>
               <a:buSzPct val="45000"/>
-              <a:buFont typeface="StarSymbol"/>
+              <a:buFont typeface="Wingdings" charset="2"/>
               <a:buChar char=""/>
             </a:pPr>
             <a:r>
-              <a:rPr lang="en-IN" sz="2400">
+              <a:rPr b="0" lang="en-IN" sz="2400" spc="-1" strike="noStrike">
+                <a:solidFill>
+                  <a:srgbClr val="000000"/>
+                </a:solidFill>
+                <a:uFill>
+                  <a:solidFill>
+                    <a:srgbClr val="ffffff"/>
+                  </a:solidFill>
+                </a:uFill>
                 <a:latin typeface="Arial"/>
               </a:rPr>
               <a:t>Third Outline Level</a:t>
             </a:r>
-            <a:endParaRPr/>
-          </a:p>
-          <a:p>
-            <a:pPr lvl="3">
+            <a:endParaRPr b="0" lang="en-IN" sz="2400" spc="-1" strike="noStrike">
+              <a:solidFill>
+                <a:srgbClr val="000000"/>
+              </a:solidFill>
+              <a:uFill>
+                <a:solidFill>
+                  <a:srgbClr val="ffffff"/>
+                </a:solidFill>
+              </a:uFill>
+              <a:latin typeface="Arial"/>
+            </a:endParaRPr>
+          </a:p>
+          <a:p>
+            <a:pPr lvl="3" marL="1728000" indent="-216000">
+              <a:buClr>
+                <a:srgbClr val="000000"/>
+              </a:buClr>
               <a:buSzPct val="75000"/>
-              <a:buFont typeface="StarSymbol"/>
+              <a:buFont typeface="Symbol" charset="2"/>
               <a:buChar char=""/>
             </a:pPr>
             <a:r>
-              <a:rPr lang="en-IN" sz="2000">
+              <a:rPr b="0" lang="en-IN" sz="2000" spc="-1" strike="noStrike">
+                <a:solidFill>
+                  <a:srgbClr val="000000"/>
+                </a:solidFill>
+                <a:uFill>
+                  <a:solidFill>
+                    <a:srgbClr val="ffffff"/>
+                  </a:solidFill>
+                </a:uFill>
                 <a:latin typeface="Arial"/>
               </a:rPr>
               <a:t>Fourth Outline Level</a:t>
             </a:r>
-            <a:endParaRPr/>
-          </a:p>
-          <a:p>
-            <a:pPr lvl="4">
+            <a:endParaRPr b="0" lang="en-IN" sz="2000" spc="-1" strike="noStrike">
+              <a:solidFill>
+                <a:srgbClr val="000000"/>
+              </a:solidFill>
+              <a:uFill>
+                <a:solidFill>
+                  <a:srgbClr val="ffffff"/>
+                </a:solidFill>
+              </a:uFill>
+              <a:latin typeface="Arial"/>
+            </a:endParaRPr>
+          </a:p>
+          <a:p>
+            <a:pPr lvl="4" marL="2160000" indent="-216000">
+              <a:buClr>
+                <a:srgbClr val="000000"/>
+              </a:buClr>
               <a:buSzPct val="45000"/>
-              <a:buFont typeface="StarSymbol"/>
+              <a:buFont typeface="Wingdings" charset="2"/>
               <a:buChar char=""/>
             </a:pPr>
             <a:r>
-              <a:rPr lang="en-IN" sz="2000">
+              <a:rPr b="0" lang="en-IN" sz="2000" spc="-1" strike="noStrike">
+                <a:solidFill>
+                  <a:srgbClr val="000000"/>
+                </a:solidFill>
+                <a:uFill>
+                  <a:solidFill>
+                    <a:srgbClr val="ffffff"/>
+                  </a:solidFill>
+                </a:uFill>
                 <a:latin typeface="Arial"/>
               </a:rPr>
               <a:t>Fifth Outline Level</a:t>
             </a:r>
-            <a:endParaRPr/>
-          </a:p>
-          <a:p>
-            <a:pPr lvl="5">
+            <a:endParaRPr b="0" lang="en-IN" sz="2000" spc="-1" strike="noStrike">
+              <a:solidFill>
+                <a:srgbClr val="000000"/>
+              </a:solidFill>
+              <a:uFill>
+                <a:solidFill>
+                  <a:srgbClr val="ffffff"/>
+                </a:solidFill>
+              </a:uFill>
+              <a:latin typeface="Arial"/>
+            </a:endParaRPr>
+          </a:p>
+          <a:p>
+            <a:pPr lvl="5" marL="2592000" indent="-216000">
+              <a:buClr>
+                <a:srgbClr val="000000"/>
+              </a:buClr>
               <a:buSzPct val="45000"/>
-              <a:buFont typeface="StarSymbol"/>
+              <a:buFont typeface="Wingdings" charset="2"/>
               <a:buChar char=""/>
             </a:pPr>
             <a:r>
-              <a:rPr lang="en-IN" sz="2000">
+              <a:rPr b="0" lang="en-IN" sz="2000" spc="-1" strike="noStrike">
+                <a:solidFill>
+                  <a:srgbClr val="000000"/>
+                </a:solidFill>
+                <a:uFill>
+                  <a:solidFill>
+                    <a:srgbClr val="ffffff"/>
+                  </a:solidFill>
+                </a:uFill>
                 <a:latin typeface="Arial"/>
               </a:rPr>
               <a:t>Sixth Outline Level</a:t>
             </a:r>
-            <a:endParaRPr/>
-          </a:p>
-          <a:p>
-            <a:pPr lvl="6">
+            <a:endParaRPr b="0" lang="en-IN" sz="2000" spc="-1" strike="noStrike">
+              <a:solidFill>
+                <a:srgbClr val="000000"/>
+              </a:solidFill>
+              <a:uFill>
+                <a:solidFill>
+                  <a:srgbClr val="ffffff"/>
+                </a:solidFill>
+              </a:uFill>
+              <a:latin typeface="Arial"/>
+            </a:endParaRPr>
+          </a:p>
+          <a:p>
+            <a:pPr lvl="6" marL="3024000" indent="-216000">
+              <a:buClr>
+                <a:srgbClr val="000000"/>
+              </a:buClr>
               <a:buSzPct val="45000"/>
-              <a:buFont typeface="StarSymbol"/>
+              <a:buFont typeface="Wingdings" charset="2"/>
               <a:buChar char=""/>
             </a:pPr>
             <a:r>
-              <a:rPr lang="en-IN" sz="2000">
+              <a:rPr b="0" lang="en-IN" sz="2000" spc="-1" strike="noStrike">
+                <a:solidFill>
+                  <a:srgbClr val="000000"/>
+                </a:solidFill>
+                <a:uFill>
+                  <a:solidFill>
+                    <a:srgbClr val="ffffff"/>
+                  </a:solidFill>
+                </a:uFill>
                 <a:latin typeface="Arial"/>
               </a:rPr>
               <a:t>Seventh Outline Level</a:t>
             </a:r>
-            <a:endParaRPr/>
+            <a:endParaRPr b="0" lang="en-IN" sz="2000" spc="-1" strike="noStrike">
+              <a:solidFill>
+                <a:srgbClr val="000000"/>
+              </a:solidFill>
+              <a:uFill>
+                <a:solidFill>
+                  <a:srgbClr val="ffffff"/>
+                </a:solidFill>
+              </a:uFill>
+              <a:latin typeface="Arial"/>
+            </a:endParaRPr>
           </a:p>
         </p:txBody>
       </p:sp>
@@ -1394,7 +1873,7 @@
 </file>
 
 <file path=ppt/slides/slide1.xml><?xml version="1.0" encoding="utf-8"?>
-<p:sld xmlns:a="http://schemas.openxmlformats.org/drawingml/2006/main" xmlns:p="http://schemas.openxmlformats.org/presentationml/2006/main" xmlns:r="http://schemas.openxmlformats.org/officeDocument/2006/relationships">
+<p:sld xmlns:a="http://schemas.openxmlformats.org/drawingml/2006/main" xmlns:p="http://schemas.openxmlformats.org/presentationml/2006/main" xmlns:r="http://schemas.openxmlformats.org/officeDocument/2006/relationships" xmlns:p14="http://schemas.microsoft.com/office/powerpoint/2010/main" xmlns:p15="http://schemas.microsoft.com/office/powerpoint/2012/main" xmlns:mc="http://schemas.openxmlformats.org/markup-compatibility/2006">
   <p:cSld>
     <p:spTree>
       <p:nvGrpSpPr>
@@ -1419,7 +1898,7 @@
         <p:spPr>
           <a:xfrm>
             <a:off x="967320" y="298800"/>
-            <a:ext cx="29119320" cy="2481840"/>
+            <a:ext cx="29119680" cy="2482200"/>
           </a:xfrm>
           <a:prstGeom prst="rect">
             <a:avLst/>
@@ -1429,6 +1908,12 @@
             <a:noFill/>
           </a:ln>
         </p:spPr>
+        <p:style>
+          <a:lnRef idx="0"/>
+          <a:fillRef idx="0"/>
+          <a:effectRef idx="0"/>
+          <a:fontRef idx="minor"/>
+        </p:style>
       </p:sp>
       <p:sp>
         <p:nvSpPr>
@@ -1439,7 +1924,7 @@
         <p:spPr>
           <a:xfrm>
             <a:off x="967320" y="298800"/>
-            <a:ext cx="29119320" cy="2481840"/>
+            <a:ext cx="29119680" cy="2482200"/>
           </a:xfrm>
           <a:prstGeom prst="rect">
             <a:avLst/>
@@ -1449,6 +1934,12 @@
             <a:noFill/>
           </a:ln>
         </p:spPr>
+        <p:style>
+          <a:lnRef idx="0"/>
+          <a:fillRef idx="0"/>
+          <a:effectRef idx="0"/>
+          <a:fontRef idx="minor"/>
+        </p:style>
         <p:txBody>
           <a:bodyPr lIns="182880" rIns="182880" tIns="91440" bIns="91440" anchor="ctr"/>
           <a:p>
@@ -1458,15 +1949,30 @@
               </a:lnSpc>
             </a:pPr>
             <a:r>
-              <a:rPr b="1" lang="en-IN" sz="8800">
-                <a:solidFill>
-                  <a:srgbClr val="ffffff"/>
-                </a:solidFill>
+              <a:rPr b="1" lang="en-IN" sz="8800" spc="-1" strike="noStrike">
+                <a:solidFill>
+                  <a:srgbClr val="ffffff"/>
+                </a:solidFill>
+                <a:uFill>
+                  <a:solidFill>
+                    <a:srgbClr val="ffffff"/>
+                  </a:solidFill>
+                </a:uFill>
                 <a:latin typeface="Calibri"/>
               </a:rPr>
               <a:t>Authentication and Authorization Between Services</a:t>
             </a:r>
-            <a:endParaRPr/>
+            <a:endParaRPr b="0" lang="en-IN" sz="1800" spc="-1" strike="noStrike">
+              <a:solidFill>
+                <a:srgbClr val="000000"/>
+              </a:solidFill>
+              <a:uFill>
+                <a:solidFill>
+                  <a:srgbClr val="ffffff"/>
+                </a:solidFill>
+              </a:uFill>
+              <a:latin typeface="Arial"/>
+            </a:endParaRPr>
           </a:p>
         </p:txBody>
       </p:sp>
@@ -1478,27 +1984,50 @@
         </p:nvSpPr>
         <p:spPr>
           <a:xfrm>
-            <a:off x="936000" y="4506480"/>
-            <a:ext cx="10976040" cy="19253160"/>
+            <a:off x="111600" y="11634480"/>
+            <a:ext cx="10616400" cy="11837520"/>
           </a:xfrm>
           <a:prstGeom prst="rect">
             <a:avLst/>
           </a:prstGeom>
           <a:gradFill>
             <a:gsLst>
-              <a:gs pos="0">
-                <a:srgbClr val="7f7f7f"/>
+              <a:gs pos="50000">
+                <a:schemeClr val="bg1">
+                  <a:shade val="30000"/>
+                  <a:satMod val="115000"/>
+                  <a:alpha val="10000"/>
+                  <a:shade val="67500"/>
+                  <a:satMod val="115000"/>
+                </a:schemeClr>
               </a:gs>
               <a:gs pos="100000">
-                <a:srgbClr val="ffffff"/>
+                <a:schemeClr val="bg1">
+                  <a:shade val="100000"/>
+                  <a:satMod val="115000"/>
+                </a:schemeClr>
               </a:gs>
             </a:gsLst>
             <a:lin ang="5400000"/>
           </a:gradFill>
-          <a:ln w="25560">
+          <a:ln>
             <a:noFill/>
           </a:ln>
         </p:spPr>
+        <p:style>
+          <a:lnRef idx="2">
+            <a:schemeClr val="accent1">
+              <a:shade val="50000"/>
+            </a:schemeClr>
+          </a:lnRef>
+          <a:fillRef idx="1">
+            <a:schemeClr val="accent1"/>
+          </a:fillRef>
+          <a:effectRef idx="0">
+            <a:schemeClr val="accent1"/>
+          </a:effectRef>
+          <a:fontRef idx="minor"/>
+        </p:style>
       </p:sp>
       <p:sp>
         <p:nvSpPr>
@@ -1508,128 +2037,636 @@
         </p:nvSpPr>
         <p:spPr>
           <a:xfrm>
-            <a:off x="12592440" y="4495320"/>
-            <a:ext cx="10976040" cy="11055960"/>
+            <a:off x="607320" y="12087000"/>
+            <a:ext cx="10120680" cy="14899320"/>
+          </a:xfrm>
+          <a:prstGeom prst="rect">
+            <a:avLst/>
+          </a:prstGeom>
+          <a:noFill/>
+          <a:ln>
+            <a:noFill/>
+          </a:ln>
+        </p:spPr>
+        <p:style>
+          <a:lnRef idx="0"/>
+          <a:fillRef idx="0"/>
+          <a:effectRef idx="0"/>
+          <a:fontRef idx="minor"/>
+        </p:style>
+        <p:txBody>
+          <a:bodyPr lIns="182880" rIns="182880" tIns="91440" bIns="91440"/>
+          <a:p>
+            <a:pPr>
+              <a:lnSpc>
+                <a:spcPct val="100000"/>
+              </a:lnSpc>
+            </a:pPr>
+            <a:r>
+              <a:rPr b="1" lang="en-IN" sz="5700" spc="-1" strike="noStrike">
+                <a:solidFill>
+                  <a:srgbClr val="2f99cd"/>
+                </a:solidFill>
+                <a:uFill>
+                  <a:solidFill>
+                    <a:srgbClr val="ffffff"/>
+                  </a:solidFill>
+                </a:uFill>
+                <a:latin typeface="Calibri"/>
+                <a:ea typeface="Verdana"/>
+              </a:rPr>
+              <a:t>INTRODUCTION</a:t>
+            </a:r>
+            <a:endParaRPr b="0" lang="en-IN" sz="1800" spc="-1" strike="noStrike">
+              <a:solidFill>
+                <a:srgbClr val="000000"/>
+              </a:solidFill>
+              <a:uFill>
+                <a:solidFill>
+                  <a:srgbClr val="ffffff"/>
+                </a:solidFill>
+              </a:uFill>
+              <a:latin typeface="Arial"/>
+            </a:endParaRPr>
+          </a:p>
+          <a:p>
+            <a:pPr>
+              <a:lnSpc>
+                <a:spcPct val="100000"/>
+              </a:lnSpc>
+            </a:pPr>
+            <a:r>
+              <a:rPr b="0" lang="en-IN" sz="1800" spc="-1" strike="noStrike">
+                <a:solidFill>
+                  <a:srgbClr val="000000"/>
+                </a:solidFill>
+                <a:uFill>
+                  <a:solidFill>
+                    <a:srgbClr val="ffffff"/>
+                  </a:solidFill>
+                </a:uFill>
+                <a:latin typeface="Arial"/>
+                <a:ea typeface="DejaVu Sans"/>
+              </a:rPr>
+              <a:t> </a:t>
+            </a:r>
+            <a:endParaRPr b="0" lang="en-IN" sz="1800" spc="-1" strike="noStrike">
+              <a:solidFill>
+                <a:srgbClr val="000000"/>
+              </a:solidFill>
+              <a:uFill>
+                <a:solidFill>
+                  <a:srgbClr val="ffffff"/>
+                </a:solidFill>
+              </a:uFill>
+              <a:latin typeface="Arial"/>
+            </a:endParaRPr>
+          </a:p>
+          <a:p>
+            <a:pPr>
+              <a:lnSpc>
+                <a:spcPct val="100000"/>
+              </a:lnSpc>
+            </a:pPr>
+            <a:r>
+              <a:rPr b="0" lang="en-IN" sz="4800" spc="-1" strike="noStrike">
+                <a:solidFill>
+                  <a:srgbClr val="000000"/>
+                </a:solidFill>
+                <a:uFill>
+                  <a:solidFill>
+                    <a:srgbClr val="ffffff"/>
+                  </a:solidFill>
+                </a:uFill>
+                <a:latin typeface="Calibri"/>
+                <a:ea typeface="Verdana"/>
+              </a:rPr>
+              <a:t>We are trying to make an oauth service using Google as a Single Sign-On followed by common authorization for all the microservices</a:t>
+            </a:r>
+            <a:endParaRPr b="0" lang="en-IN" sz="1800" spc="-1" strike="noStrike">
+              <a:solidFill>
+                <a:srgbClr val="000000"/>
+              </a:solidFill>
+              <a:uFill>
+                <a:solidFill>
+                  <a:srgbClr val="ffffff"/>
+                </a:solidFill>
+              </a:uFill>
+              <a:latin typeface="Arial"/>
+            </a:endParaRPr>
+          </a:p>
+          <a:p>
+            <a:pPr>
+              <a:lnSpc>
+                <a:spcPct val="100000"/>
+              </a:lnSpc>
+            </a:pPr>
+            <a:r>
+              <a:rPr b="0" lang="en-IN" sz="4800" spc="-1" strike="noStrike">
+                <a:solidFill>
+                  <a:srgbClr val="000000"/>
+                </a:solidFill>
+                <a:uFill>
+                  <a:solidFill>
+                    <a:srgbClr val="ffffff"/>
+                  </a:solidFill>
+                </a:uFill>
+                <a:latin typeface="Calibri"/>
+                <a:ea typeface="Verdana"/>
+              </a:rPr>
+              <a:t>The Project could be split up into two phases:</a:t>
+            </a:r>
+            <a:endParaRPr b="0" lang="en-IN" sz="1800" spc="-1" strike="noStrike">
+              <a:solidFill>
+                <a:srgbClr val="000000"/>
+              </a:solidFill>
+              <a:uFill>
+                <a:solidFill>
+                  <a:srgbClr val="ffffff"/>
+                </a:solidFill>
+              </a:uFill>
+              <a:latin typeface="Arial"/>
+            </a:endParaRPr>
+          </a:p>
+          <a:p>
+            <a:pPr>
+              <a:lnSpc>
+                <a:spcPct val="100000"/>
+              </a:lnSpc>
+            </a:pPr>
+            <a:r>
+              <a:rPr b="0" lang="en-IN" sz="4800" spc="-1" strike="noStrike">
+                <a:solidFill>
+                  <a:srgbClr val="000000"/>
+                </a:solidFill>
+                <a:uFill>
+                  <a:solidFill>
+                    <a:srgbClr val="ffffff"/>
+                  </a:solidFill>
+                </a:uFill>
+                <a:latin typeface="Calibri"/>
+                <a:ea typeface="Verdana"/>
+              </a:rPr>
+              <a:t>1. Surveying and Research</a:t>
+            </a:r>
+            <a:endParaRPr b="0" lang="en-IN" sz="1800" spc="-1" strike="noStrike">
+              <a:solidFill>
+                <a:srgbClr val="000000"/>
+              </a:solidFill>
+              <a:uFill>
+                <a:solidFill>
+                  <a:srgbClr val="ffffff"/>
+                </a:solidFill>
+              </a:uFill>
+              <a:latin typeface="Arial"/>
+            </a:endParaRPr>
+          </a:p>
+          <a:p>
+            <a:pPr>
+              <a:lnSpc>
+                <a:spcPct val="100000"/>
+              </a:lnSpc>
+            </a:pPr>
+            <a:r>
+              <a:rPr b="0" lang="en-IN" sz="4800" spc="-1" strike="noStrike">
+                <a:solidFill>
+                  <a:srgbClr val="000000"/>
+                </a:solidFill>
+                <a:uFill>
+                  <a:solidFill>
+                    <a:srgbClr val="ffffff"/>
+                  </a:solidFill>
+                </a:uFill>
+                <a:latin typeface="Calibri"/>
+                <a:ea typeface="Verdana"/>
+              </a:rPr>
+              <a:t>2. Implemenntation</a:t>
+            </a:r>
+            <a:endParaRPr b="0" lang="en-IN" sz="1800" spc="-1" strike="noStrike">
+              <a:solidFill>
+                <a:srgbClr val="000000"/>
+              </a:solidFill>
+              <a:uFill>
+                <a:solidFill>
+                  <a:srgbClr val="ffffff"/>
+                </a:solidFill>
+              </a:uFill>
+              <a:latin typeface="Arial"/>
+            </a:endParaRPr>
+          </a:p>
+          <a:p>
+            <a:pPr>
+              <a:lnSpc>
+                <a:spcPct val="100000"/>
+              </a:lnSpc>
+            </a:pPr>
+            <a:endParaRPr b="0" lang="en-IN" sz="1800" spc="-1" strike="noStrike">
+              <a:solidFill>
+                <a:srgbClr val="000000"/>
+              </a:solidFill>
+              <a:uFill>
+                <a:solidFill>
+                  <a:srgbClr val="ffffff"/>
+                </a:solidFill>
+              </a:uFill>
+              <a:latin typeface="Arial"/>
+            </a:endParaRPr>
+          </a:p>
+          <a:p>
+            <a:pPr>
+              <a:lnSpc>
+                <a:spcPct val="100000"/>
+              </a:lnSpc>
+            </a:pPr>
+            <a:r>
+              <a:rPr b="1" lang="en-IN" sz="5700" spc="-1" strike="noStrike">
+                <a:solidFill>
+                  <a:srgbClr val="2f99cd"/>
+                </a:solidFill>
+                <a:uFill>
+                  <a:solidFill>
+                    <a:srgbClr val="ffffff"/>
+                  </a:solidFill>
+                </a:uFill>
+                <a:latin typeface="Calibri"/>
+                <a:ea typeface="Verdana"/>
+              </a:rPr>
+              <a:t>Phase 1</a:t>
+            </a:r>
+            <a:endParaRPr b="0" lang="en-IN" sz="1800" spc="-1" strike="noStrike">
+              <a:solidFill>
+                <a:srgbClr val="000000"/>
+              </a:solidFill>
+              <a:uFill>
+                <a:solidFill>
+                  <a:srgbClr val="ffffff"/>
+                </a:solidFill>
+              </a:uFill>
+              <a:latin typeface="Arial"/>
+            </a:endParaRPr>
+          </a:p>
+          <a:p>
+            <a:pPr>
+              <a:lnSpc>
+                <a:spcPct val="100000"/>
+              </a:lnSpc>
+            </a:pPr>
+            <a:r>
+              <a:rPr b="0" lang="en-IN" sz="1800" spc="-1" strike="noStrike">
+                <a:solidFill>
+                  <a:srgbClr val="000000"/>
+                </a:solidFill>
+                <a:uFill>
+                  <a:solidFill>
+                    <a:srgbClr val="ffffff"/>
+                  </a:solidFill>
+                </a:uFill>
+                <a:latin typeface="Arial"/>
+                <a:ea typeface="DejaVu Sans"/>
+              </a:rPr>
+              <a:t>  </a:t>
+            </a:r>
+            <a:endParaRPr b="0" lang="en-IN" sz="1800" spc="-1" strike="noStrike">
+              <a:solidFill>
+                <a:srgbClr val="000000"/>
+              </a:solidFill>
+              <a:uFill>
+                <a:solidFill>
+                  <a:srgbClr val="ffffff"/>
+                </a:solidFill>
+              </a:uFill>
+              <a:latin typeface="Arial"/>
+            </a:endParaRPr>
+          </a:p>
+          <a:p>
+            <a:pPr>
+              <a:lnSpc>
+                <a:spcPct val="100000"/>
+              </a:lnSpc>
+            </a:pPr>
+            <a:r>
+              <a:rPr b="0" lang="en-IN" sz="4800" spc="-1" strike="noStrike">
+                <a:solidFill>
+                  <a:srgbClr val="000000"/>
+                </a:solidFill>
+                <a:uFill>
+                  <a:solidFill>
+                    <a:srgbClr val="ffffff"/>
+                  </a:solidFill>
+                </a:uFill>
+                <a:latin typeface="Calibri"/>
+                <a:ea typeface="Verdana"/>
+              </a:rPr>
+              <a:t>We needed to survey current industrial standards according to our requirements and look for for possible solutions.</a:t>
+            </a:r>
+            <a:endParaRPr b="0" lang="en-IN" sz="1800" spc="-1" strike="noStrike">
+              <a:solidFill>
+                <a:srgbClr val="000000"/>
+              </a:solidFill>
+              <a:uFill>
+                <a:solidFill>
+                  <a:srgbClr val="ffffff"/>
+                </a:solidFill>
+              </a:uFill>
+              <a:latin typeface="Arial"/>
+            </a:endParaRPr>
+          </a:p>
+          <a:p>
+            <a:pPr>
+              <a:lnSpc>
+                <a:spcPct val="100000"/>
+              </a:lnSpc>
+            </a:pPr>
+            <a:endParaRPr b="0" lang="en-IN" sz="1800" spc="-1" strike="noStrike">
+              <a:solidFill>
+                <a:srgbClr val="000000"/>
+              </a:solidFill>
+              <a:uFill>
+                <a:solidFill>
+                  <a:srgbClr val="ffffff"/>
+                </a:solidFill>
+              </a:uFill>
+              <a:latin typeface="Arial"/>
+            </a:endParaRPr>
+          </a:p>
+          <a:p>
+            <a:pPr>
+              <a:lnSpc>
+                <a:spcPct val="100000"/>
+              </a:lnSpc>
+            </a:pPr>
+            <a:endParaRPr b="0" lang="en-IN" sz="1800" spc="-1" strike="noStrike">
+              <a:solidFill>
+                <a:srgbClr val="000000"/>
+              </a:solidFill>
+              <a:uFill>
+                <a:solidFill>
+                  <a:srgbClr val="ffffff"/>
+                </a:solidFill>
+              </a:uFill>
+              <a:latin typeface="Arial"/>
+            </a:endParaRPr>
+          </a:p>
+          <a:p>
+            <a:pPr>
+              <a:lnSpc>
+                <a:spcPct val="100000"/>
+              </a:lnSpc>
+            </a:pPr>
+            <a:endParaRPr b="0" lang="en-IN" sz="1800" spc="-1" strike="noStrike">
+              <a:solidFill>
+                <a:srgbClr val="000000"/>
+              </a:solidFill>
+              <a:uFill>
+                <a:solidFill>
+                  <a:srgbClr val="ffffff"/>
+                </a:solidFill>
+              </a:uFill>
+              <a:latin typeface="Arial"/>
+            </a:endParaRPr>
+          </a:p>
+          <a:p>
+            <a:pPr>
+              <a:lnSpc>
+                <a:spcPct val="100000"/>
+              </a:lnSpc>
+            </a:pPr>
+            <a:endParaRPr b="0" lang="en-IN" sz="1800" spc="-1" strike="noStrike">
+              <a:solidFill>
+                <a:srgbClr val="000000"/>
+              </a:solidFill>
+              <a:uFill>
+                <a:solidFill>
+                  <a:srgbClr val="ffffff"/>
+                </a:solidFill>
+              </a:uFill>
+              <a:latin typeface="Arial"/>
+            </a:endParaRPr>
+          </a:p>
+        </p:txBody>
+      </p:sp>
+      <p:sp>
+        <p:nvSpPr>
+          <p:cNvPr id="41" name="CustomShape 5"/>
+          <p:cNvSpPr/>
+          <p:nvPr/>
+        </p:nvSpPr>
+        <p:spPr>
+          <a:xfrm>
+            <a:off x="12024000" y="3744000"/>
+            <a:ext cx="10976400" cy="22680000"/>
           </a:xfrm>
           <a:prstGeom prst="rect">
             <a:avLst/>
           </a:prstGeom>
           <a:gradFill>
             <a:gsLst>
-              <a:gs pos="0">
-                <a:srgbClr val="7f7f7f"/>
+              <a:gs pos="50000">
+                <a:schemeClr val="bg1">
+                  <a:shade val="30000"/>
+                  <a:satMod val="115000"/>
+                  <a:alpha val="10000"/>
+                  <a:shade val="67500"/>
+                  <a:satMod val="115000"/>
+                </a:schemeClr>
               </a:gs>
               <a:gs pos="100000">
-                <a:srgbClr val="ffffff"/>
+                <a:schemeClr val="bg1">
+                  <a:shade val="100000"/>
+                  <a:satMod val="115000"/>
+                </a:schemeClr>
               </a:gs>
             </a:gsLst>
             <a:lin ang="5400000"/>
           </a:gradFill>
-          <a:ln w="25560">
+          <a:ln>
             <a:noFill/>
           </a:ln>
         </p:spPr>
-      </p:sp>
-      <p:sp>
-        <p:nvSpPr>
-          <p:cNvPr id="41" name="CustomShape 5"/>
+        <p:style>
+          <a:lnRef idx="2">
+            <a:schemeClr val="accent1">
+              <a:shade val="50000"/>
+            </a:schemeClr>
+          </a:lnRef>
+          <a:fillRef idx="1">
+            <a:schemeClr val="accent1"/>
+          </a:fillRef>
+          <a:effectRef idx="0">
+            <a:schemeClr val="accent1"/>
+          </a:effectRef>
+          <a:fontRef idx="minor"/>
+        </p:style>
+      </p:sp>
+      <p:sp>
+        <p:nvSpPr>
+          <p:cNvPr id="42" name="CustomShape 6"/>
           <p:cNvSpPr/>
           <p:nvPr/>
         </p:nvSpPr>
         <p:spPr>
           <a:xfrm>
-            <a:off x="24141600" y="4458960"/>
-            <a:ext cx="17532000" cy="7015320"/>
+            <a:off x="179640" y="3744000"/>
+            <a:ext cx="10620360" cy="7992000"/>
           </a:xfrm>
           <a:prstGeom prst="rect">
             <a:avLst/>
           </a:prstGeom>
           <a:gradFill>
             <a:gsLst>
-              <a:gs pos="0">
-                <a:srgbClr val="7f7f7f"/>
+              <a:gs pos="50000">
+                <a:schemeClr val="bg1">
+                  <a:shade val="30000"/>
+                  <a:satMod val="115000"/>
+                  <a:alpha val="10000"/>
+                  <a:shade val="67500"/>
+                  <a:satMod val="115000"/>
+                </a:schemeClr>
               </a:gs>
               <a:gs pos="100000">
-                <a:srgbClr val="ffffff"/>
+                <a:schemeClr val="bg1">
+                  <a:shade val="100000"/>
+                  <a:satMod val="115000"/>
+                </a:schemeClr>
               </a:gs>
             </a:gsLst>
             <a:lin ang="5400000"/>
           </a:gradFill>
-          <a:ln w="25560">
+          <a:ln>
             <a:noFill/>
           </a:ln>
         </p:spPr>
-      </p:sp>
-      <p:sp>
-        <p:nvSpPr>
-          <p:cNvPr id="42" name="CustomShape 6"/>
+        <p:style>
+          <a:lnRef idx="2">
+            <a:schemeClr val="accent1">
+              <a:shade val="50000"/>
+            </a:schemeClr>
+          </a:lnRef>
+          <a:fillRef idx="1">
+            <a:schemeClr val="accent1"/>
+          </a:fillRef>
+          <a:effectRef idx="0">
+            <a:schemeClr val="accent1"/>
+          </a:effectRef>
+          <a:fontRef idx="minor"/>
+        </p:style>
+      </p:sp>
+      <p:sp>
+        <p:nvSpPr>
+          <p:cNvPr id="43" name="CustomShape 7"/>
           <p:cNvSpPr/>
           <p:nvPr/>
         </p:nvSpPr>
         <p:spPr>
           <a:xfrm>
-            <a:off x="24141600" y="10711080"/>
-            <a:ext cx="17532000" cy="7015320"/>
+            <a:off x="24192000" y="12220200"/>
+            <a:ext cx="17532360" cy="5200920"/>
           </a:xfrm>
           <a:prstGeom prst="rect">
             <a:avLst/>
           </a:prstGeom>
           <a:gradFill>
             <a:gsLst>
-              <a:gs pos="0">
-                <a:srgbClr val="7f7f7f"/>
+              <a:gs pos="50000">
+                <a:schemeClr val="bg1">
+                  <a:shade val="30000"/>
+                  <a:satMod val="115000"/>
+                  <a:alpha val="10000"/>
+                  <a:shade val="67500"/>
+                  <a:satMod val="115000"/>
+                </a:schemeClr>
               </a:gs>
               <a:gs pos="100000">
-                <a:srgbClr val="ffffff"/>
+                <a:schemeClr val="bg1">
+                  <a:shade val="100000"/>
+                  <a:satMod val="115000"/>
+                </a:schemeClr>
               </a:gs>
             </a:gsLst>
             <a:lin ang="5400000"/>
           </a:gradFill>
-          <a:ln w="25560">
+          <a:ln>
             <a:noFill/>
           </a:ln>
         </p:spPr>
-      </p:sp>
-      <p:sp>
-        <p:nvSpPr>
-          <p:cNvPr id="43" name="CustomShape 7"/>
+        <p:style>
+          <a:lnRef idx="2">
+            <a:schemeClr val="accent1">
+              <a:shade val="50000"/>
+            </a:schemeClr>
+          </a:lnRef>
+          <a:fillRef idx="1">
+            <a:schemeClr val="accent1"/>
+          </a:fillRef>
+          <a:effectRef idx="0">
+            <a:schemeClr val="accent1"/>
+          </a:effectRef>
+          <a:fontRef idx="minor"/>
+        </p:style>
+      </p:sp>
+      <p:sp>
+        <p:nvSpPr>
+          <p:cNvPr id="44" name="CustomShape 8"/>
           <p:cNvSpPr/>
           <p:nvPr/>
         </p:nvSpPr>
         <p:spPr>
           <a:xfrm>
             <a:off x="24141600" y="17421120"/>
-            <a:ext cx="17532000" cy="7015320"/>
+            <a:ext cx="17532360" cy="7015680"/>
           </a:xfrm>
           <a:prstGeom prst="rect">
             <a:avLst/>
           </a:prstGeom>
           <a:gradFill>
             <a:gsLst>
-              <a:gs pos="0">
-                <a:srgbClr val="7f7f7f"/>
+              <a:gs pos="50000">
+                <a:schemeClr val="bg1">
+                  <a:shade val="30000"/>
+                  <a:satMod val="115000"/>
+                  <a:alpha val="10000"/>
+                  <a:shade val="67500"/>
+                  <a:satMod val="115000"/>
+                </a:schemeClr>
               </a:gs>
               <a:gs pos="100000">
-                <a:srgbClr val="ffffff"/>
+                <a:schemeClr val="bg1">
+                  <a:shade val="100000"/>
+                  <a:satMod val="115000"/>
+                </a:schemeClr>
               </a:gs>
             </a:gsLst>
             <a:lin ang="5400000"/>
           </a:gradFill>
-          <a:ln w="25560">
+          <a:ln>
             <a:noFill/>
           </a:ln>
         </p:spPr>
-      </p:sp>
-      <p:sp>
-        <p:nvSpPr>
-          <p:cNvPr id="44" name="CustomShape 8"/>
+        <p:style>
+          <a:lnRef idx="2">
+            <a:schemeClr val="accent1">
+              <a:shade val="50000"/>
+            </a:schemeClr>
+          </a:lnRef>
+          <a:fillRef idx="1">
+            <a:schemeClr val="accent1"/>
+          </a:fillRef>
+          <a:effectRef idx="0">
+            <a:schemeClr val="accent1"/>
+          </a:effectRef>
+          <a:fontRef idx="minor"/>
+        </p:style>
+      </p:sp>
+      <p:sp>
+        <p:nvSpPr>
+          <p:cNvPr id="45" name="CustomShape 9"/>
           <p:cNvSpPr/>
           <p:nvPr/>
         </p:nvSpPr>
         <p:spPr>
           <a:xfrm>
-            <a:off x="13202280" y="4947840"/>
-            <a:ext cx="10197720" cy="17588160"/>
+            <a:off x="12129840" y="4464000"/>
+            <a:ext cx="10046160" cy="12054960"/>
           </a:xfrm>
           <a:prstGeom prst="rect">
             <a:avLst/>
@@ -1639,6 +2676,12 @@
             <a:noFill/>
           </a:ln>
         </p:spPr>
+        <p:style>
+          <a:lnRef idx="0"/>
+          <a:fillRef idx="0"/>
+          <a:effectRef idx="0"/>
+          <a:fontRef idx="minor"/>
+        </p:style>
         <p:txBody>
           <a:bodyPr lIns="182880" rIns="182880" tIns="91440" bIns="91440"/>
           <a:p>
@@ -1648,24 +2691,214 @@
               </a:lnSpc>
             </a:pPr>
             <a:r>
-              <a:rPr b="1" lang="en-IN" sz="5700">
+              <a:rPr b="1" lang="en-IN" sz="5700" spc="-1" strike="noStrike">
                 <a:solidFill>
                   <a:srgbClr val="2f99cd"/>
                 </a:solidFill>
+                <a:uFill>
+                  <a:solidFill>
+                    <a:srgbClr val="ffffff"/>
+                  </a:solidFill>
+                </a:uFill>
+                <a:latin typeface="Calibri"/>
+                <a:ea typeface="Verdana"/>
+              </a:rPr>
+              <a:t>Phase 2 </a:t>
+            </a:r>
+            <a:endParaRPr b="0" lang="en-IN" sz="1800" spc="-1" strike="noStrike">
+              <a:solidFill>
+                <a:srgbClr val="000000"/>
+              </a:solidFill>
+              <a:uFill>
+                <a:solidFill>
+                  <a:srgbClr val="ffffff"/>
+                </a:solidFill>
+              </a:uFill>
+              <a:latin typeface="Arial"/>
+            </a:endParaRPr>
+          </a:p>
+          <a:p>
+            <a:pPr>
+              <a:lnSpc>
+                <a:spcPct val="100000"/>
+              </a:lnSpc>
+            </a:pPr>
+            <a:r>
+              <a:rPr b="0" lang="en-IN" sz="1800" spc="-1" strike="noStrike">
+                <a:solidFill>
+                  <a:srgbClr val="000000"/>
+                </a:solidFill>
+                <a:uFill>
+                  <a:solidFill>
+                    <a:srgbClr val="ffffff"/>
+                  </a:solidFill>
+                </a:uFill>
+                <a:latin typeface="Arial"/>
+                <a:ea typeface="DejaVu Sans"/>
+              </a:rPr>
+              <a:t> </a:t>
+            </a:r>
+            <a:endParaRPr b="0" lang="en-IN" sz="1800" spc="-1" strike="noStrike">
+              <a:solidFill>
+                <a:srgbClr val="000000"/>
+              </a:solidFill>
+              <a:uFill>
+                <a:solidFill>
+                  <a:srgbClr val="ffffff"/>
+                </a:solidFill>
+              </a:uFill>
+              <a:latin typeface="Arial"/>
+            </a:endParaRPr>
+          </a:p>
+          <a:p>
+            <a:pPr>
+              <a:lnSpc>
+                <a:spcPct val="100000"/>
+              </a:lnSpc>
+            </a:pPr>
+            <a:r>
+              <a:rPr b="0" lang="en-IN" sz="4800" spc="-1" strike="noStrike">
+                <a:solidFill>
+                  <a:srgbClr val="000000"/>
+                </a:solidFill>
+                <a:uFill>
+                  <a:solidFill>
+                    <a:srgbClr val="ffffff"/>
+                  </a:solidFill>
+                </a:uFill>
+                <a:latin typeface="Calibri"/>
+                <a:ea typeface="Verdana"/>
+              </a:rPr>
+              <a:t>We have done an implementation of the oauth service model using an Oauth Server,</a:t>
+            </a:r>
+            <a:r>
+              <a:rPr b="0" lang="en-IN" sz="4800" spc="-1" strike="noStrike">
+                <a:solidFill>
+                  <a:srgbClr val="000000"/>
+                </a:solidFill>
+                <a:uFill>
+                  <a:solidFill>
+                    <a:srgbClr val="ffffff"/>
+                  </a:solidFill>
+                </a:uFill>
+                <a:latin typeface="Calibri"/>
+                <a:ea typeface="Verdana"/>
+              </a:rPr>
+              <a:t>	</a:t>
+            </a:r>
+            <a:r>
+              <a:rPr b="0" lang="en-IN" sz="4800" spc="-1" strike="noStrike">
+                <a:solidFill>
+                  <a:srgbClr val="000000"/>
+                </a:solidFill>
+                <a:uFill>
+                  <a:solidFill>
+                    <a:srgbClr val="ffffff"/>
+                  </a:solidFill>
+                </a:uFill>
+                <a:latin typeface="Calibri"/>
+                <a:ea typeface="Verdana"/>
+              </a:rPr>
+              <a:t>a client server and LDS dashboard, an existing VLEAD microservice.</a:t>
+            </a:r>
+            <a:endParaRPr b="0" lang="en-IN" sz="1800" spc="-1" strike="noStrike">
+              <a:solidFill>
+                <a:srgbClr val="000000"/>
+              </a:solidFill>
+              <a:uFill>
+                <a:solidFill>
+                  <a:srgbClr val="ffffff"/>
+                </a:solidFill>
+              </a:uFill>
+              <a:latin typeface="Arial"/>
+            </a:endParaRPr>
+          </a:p>
+          <a:p>
+            <a:pPr>
+              <a:lnSpc>
+                <a:spcPct val="100000"/>
+              </a:lnSpc>
+            </a:pPr>
+            <a:endParaRPr b="0" lang="en-IN" sz="1800" spc="-1" strike="noStrike">
+              <a:solidFill>
+                <a:srgbClr val="000000"/>
+              </a:solidFill>
+              <a:uFill>
+                <a:solidFill>
+                  <a:srgbClr val="ffffff"/>
+                </a:solidFill>
+              </a:uFill>
+              <a:latin typeface="Arial"/>
+            </a:endParaRPr>
+          </a:p>
+          <a:p>
+            <a:pPr>
+              <a:lnSpc>
+                <a:spcPct val="100000"/>
+              </a:lnSpc>
+            </a:pPr>
+            <a:endParaRPr b="0" lang="en-IN" sz="1800" spc="-1" strike="noStrike">
+              <a:solidFill>
+                <a:srgbClr val="000000"/>
+              </a:solidFill>
+              <a:uFill>
+                <a:solidFill>
+                  <a:srgbClr val="ffffff"/>
+                </a:solidFill>
+              </a:uFill>
+              <a:latin typeface="Arial"/>
+            </a:endParaRPr>
+          </a:p>
+          <a:p>
+            <a:pPr>
+              <a:lnSpc>
+                <a:spcPct val="100000"/>
+              </a:lnSpc>
+            </a:pPr>
+            <a:r>
+              <a:rPr b="1" lang="en-IN" sz="5700" spc="-1" strike="noStrike">
+                <a:solidFill>
+                  <a:srgbClr val="2f99cd"/>
+                </a:solidFill>
+                <a:uFill>
+                  <a:solidFill>
+                    <a:srgbClr val="ffffff"/>
+                  </a:solidFill>
+                </a:uFill>
                 <a:latin typeface="Calibri"/>
                 <a:ea typeface="Verdana"/>
               </a:rPr>
               <a:t>METHODS</a:t>
             </a:r>
-            <a:endParaRPr/>
-          </a:p>
-          <a:p>
-            <a:pPr>
-              <a:lnSpc>
-                <a:spcPct val="100000"/>
-              </a:lnSpc>
-            </a:pPr>
-            <a:endParaRPr/>
+            <a:endParaRPr b="0" lang="en-IN" sz="1800" spc="-1" strike="noStrike">
+              <a:solidFill>
+                <a:srgbClr val="000000"/>
+              </a:solidFill>
+              <a:uFill>
+                <a:solidFill>
+                  <a:srgbClr val="ffffff"/>
+                </a:solidFill>
+              </a:uFill>
+              <a:latin typeface="Arial"/>
+            </a:endParaRPr>
+          </a:p>
+          <a:p>
+            <a:pPr>
+              <a:lnSpc>
+                <a:spcPct val="100000"/>
+              </a:lnSpc>
+            </a:pPr>
+            <a:endParaRPr b="0" lang="en-IN" sz="1800" spc="-1" strike="noStrike">
+              <a:solidFill>
+                <a:srgbClr val="000000"/>
+              </a:solidFill>
+              <a:uFill>
+                <a:solidFill>
+                  <a:srgbClr val="ffffff"/>
+                </a:solidFill>
+              </a:uFill>
+              <a:latin typeface="Arial"/>
+            </a:endParaRPr>
           </a:p>
           <a:p>
             <a:pPr>
@@ -1674,42 +2907,82 @@
               </a:lnSpc>
             </a:pPr>
             <a:r>
-              <a:rPr lang="en-IN" sz="3600">
+              <a:rPr b="0" lang="en-IN" sz="4800" spc="-1" strike="noStrike">
                 <a:solidFill>
                   <a:srgbClr val="000000"/>
                 </a:solidFill>
+                <a:uFill>
+                  <a:solidFill>
+                    <a:srgbClr val="ffffff"/>
+                  </a:solidFill>
+                </a:uFill>
                 <a:latin typeface="Calibri"/>
                 <a:ea typeface="Verdana"/>
               </a:rPr>
-              <a:t>1.In our OAuth Model the user opens one of the microservices and tries to login into VLEAD</a:t>
+              <a:t>1. In our Oauth Model the user opens one of the microservices and tries to login into VLEAD</a:t>
             </a:r>
+            <a:endParaRPr b="0" lang="en-IN" sz="1800" spc="-1" strike="noStrike">
+              <a:solidFill>
+                <a:srgbClr val="000000"/>
+              </a:solidFill>
+              <a:uFill>
+                <a:solidFill>
+                  <a:srgbClr val="ffffff"/>
+                </a:solidFill>
+              </a:uFill>
+              <a:latin typeface="Arial"/>
+            </a:endParaRPr>
+          </a:p>
+          <a:p>
+            <a:pPr>
+              <a:lnSpc>
+                <a:spcPct val="100000"/>
+              </a:lnSpc>
+            </a:pPr>
+            <a:endParaRPr b="0" lang="en-IN" sz="1800" spc="-1" strike="noStrike">
+              <a:solidFill>
+                <a:srgbClr val="000000"/>
+              </a:solidFill>
+              <a:uFill>
+                <a:solidFill>
+                  <a:srgbClr val="ffffff"/>
+                </a:solidFill>
+              </a:uFill>
+              <a:latin typeface="Arial"/>
+            </a:endParaRPr>
+          </a:p>
+          <a:p>
+            <a:pPr>
+              <a:lnSpc>
+                <a:spcPct val="100000"/>
+              </a:lnSpc>
+            </a:pPr>
             <a:r>
-              <a:rPr b="1" lang="en-IN" sz="5700">
+              <a:rPr b="1" lang="en-IN" sz="5700" spc="-1" strike="noStrike">
                 <a:solidFill>
                   <a:srgbClr val="2f99cd"/>
                 </a:solidFill>
+                <a:uFill>
+                  <a:solidFill>
+                    <a:srgbClr val="ffffff"/>
+                  </a:solidFill>
+                </a:uFill>
                 <a:latin typeface="Calibri"/>
                 <a:ea typeface="Verdana"/>
               </a:rPr>
-              <a:t> </a:t>
+              <a:t>Authentication with Google:</a:t>
             </a:r>
-            <a:endParaRPr/>
-          </a:p>
-          <a:p>
-            <a:pPr>
-              <a:lnSpc>
-                <a:spcPct val="100000"/>
-              </a:lnSpc>
-            </a:pPr>
-            <a:endParaRPr/>
-          </a:p>
-          <a:p>
-            <a:pPr>
-              <a:lnSpc>
-                <a:spcPct val="100000"/>
-              </a:lnSpc>
-            </a:pPr>
-            <a:endParaRPr/>
+            <a:endParaRPr b="0" lang="en-IN" sz="1800" spc="-1" strike="noStrike">
+              <a:solidFill>
+                <a:srgbClr val="000000"/>
+              </a:solidFill>
+              <a:uFill>
+                <a:solidFill>
+                  <a:srgbClr val="ffffff"/>
+                </a:solidFill>
+              </a:uFill>
+              <a:latin typeface="Arial"/>
+            </a:endParaRPr>
           </a:p>
           <a:p>
             <a:pPr>
@@ -1718,16 +2991,49 @@
               </a:lnSpc>
             </a:pPr>
             <a:r>
-              <a:rPr lang="en-IN" sz="3600">
-                <a:solidFill>
-                  <a:srgbClr val="2f99cd"/>
-                </a:solidFill>
+              <a:rPr b="0" lang="en-IN" sz="4800" spc="-1" strike="noStrike">
+                <a:solidFill>
+                  <a:srgbClr val="000000"/>
+                </a:solidFill>
+                <a:uFill>
+                  <a:solidFill>
+                    <a:srgbClr val="ffffff"/>
+                  </a:solidFill>
+                </a:uFill>
                 <a:latin typeface="Calibri"/>
                 <a:ea typeface="Verdana"/>
               </a:rPr>
-              <a:t>Authentication with </a:t>
+              <a:t>The user is redirected to our microservice. Using Google Sign-On, the user is authenticated by Google.</a:t>
             </a:r>
-            <a:endParaRPr/>
+            <a:endParaRPr b="0" lang="en-IN" sz="1800" spc="-1" strike="noStrike">
+              <a:solidFill>
+                <a:srgbClr val="000000"/>
+              </a:solidFill>
+              <a:uFill>
+                <a:solidFill>
+                  <a:srgbClr val="ffffff"/>
+                </a:solidFill>
+              </a:uFill>
+              <a:latin typeface="Arial"/>
+            </a:endParaRPr>
+          </a:p>
+          <a:p>
+            <a:pPr>
+              <a:lnSpc>
+                <a:spcPct val="100000"/>
+              </a:lnSpc>
+            </a:pPr>
+            <a:endParaRPr b="0" lang="en-IN" sz="1800" spc="-1" strike="noStrike">
+              <a:solidFill>
+                <a:srgbClr val="000000"/>
+              </a:solidFill>
+              <a:uFill>
+                <a:solidFill>
+                  <a:srgbClr val="ffffff"/>
+                </a:solidFill>
+              </a:uFill>
+              <a:latin typeface="Arial"/>
+            </a:endParaRPr>
           </a:p>
           <a:p>
             <a:pPr>
@@ -1736,16 +3042,31 @@
               </a:lnSpc>
             </a:pPr>
             <a:r>
-              <a:rPr lang="en-IN" sz="3600">
+              <a:rPr b="1" lang="en-IN" sz="5700" spc="-1" strike="noStrike">
                 <a:solidFill>
                   <a:srgbClr val="2f99cd"/>
                 </a:solidFill>
+                <a:uFill>
+                  <a:solidFill>
+                    <a:srgbClr val="ffffff"/>
+                  </a:solidFill>
+                </a:uFill>
                 <a:latin typeface="Calibri"/>
                 <a:ea typeface="Verdana"/>
               </a:rPr>
-              <a:t>Google:</a:t>
+              <a:t>After Authentication:</a:t>
             </a:r>
-            <a:endParaRPr/>
+            <a:endParaRPr b="0" lang="en-IN" sz="1800" spc="-1" strike="noStrike">
+              <a:solidFill>
+                <a:srgbClr val="000000"/>
+              </a:solidFill>
+              <a:uFill>
+                <a:solidFill>
+                  <a:srgbClr val="ffffff"/>
+                </a:solidFill>
+              </a:uFill>
+              <a:latin typeface="Arial"/>
+            </a:endParaRPr>
           </a:p>
           <a:p>
             <a:pPr>
@@ -1754,16 +3075,49 @@
               </a:lnSpc>
             </a:pPr>
             <a:r>
-              <a:rPr lang="en-IN" sz="3600">
+              <a:rPr b="0" lang="en-IN" sz="4800" spc="-1" strike="noStrike">
                 <a:solidFill>
                   <a:srgbClr val="000000"/>
                 </a:solidFill>
+                <a:uFill>
+                  <a:solidFill>
+                    <a:srgbClr val="ffffff"/>
+                  </a:solidFill>
+                </a:uFill>
                 <a:latin typeface="Calibri"/>
                 <a:ea typeface="Verdana"/>
               </a:rPr>
-              <a:t>The user is redirected to</a:t>
+              <a:t>Now the users credentials are available at the check_login() end point of the oauth service.</a:t>
             </a:r>
-            <a:endParaRPr/>
+            <a:endParaRPr b="0" lang="en-IN" sz="1800" spc="-1" strike="noStrike">
+              <a:solidFill>
+                <a:srgbClr val="000000"/>
+              </a:solidFill>
+              <a:uFill>
+                <a:solidFill>
+                  <a:srgbClr val="ffffff"/>
+                </a:solidFill>
+              </a:uFill>
+              <a:latin typeface="Arial"/>
+            </a:endParaRPr>
+          </a:p>
+          <a:p>
+            <a:pPr>
+              <a:lnSpc>
+                <a:spcPct val="100000"/>
+              </a:lnSpc>
+            </a:pPr>
+            <a:endParaRPr b="0" lang="en-IN" sz="1800" spc="-1" strike="noStrike">
+              <a:solidFill>
+                <a:srgbClr val="000000"/>
+              </a:solidFill>
+              <a:uFill>
+                <a:solidFill>
+                  <a:srgbClr val="ffffff"/>
+                </a:solidFill>
+              </a:uFill>
+              <a:latin typeface="Arial"/>
+            </a:endParaRPr>
           </a:p>
           <a:p>
             <a:pPr>
@@ -1772,196 +3126,31 @@
               </a:lnSpc>
             </a:pPr>
             <a:r>
-              <a:rPr lang="en-IN" sz="3600">
-                <a:solidFill>
-                  <a:srgbClr val="000000"/>
-                </a:solidFill>
-                <a:latin typeface="Calibri"/>
-                <a:ea typeface="Verdana"/>
-              </a:rPr>
-              <a:t>Our microservice and using</a:t>
-            </a:r>
-            <a:endParaRPr/>
-          </a:p>
-          <a:p>
-            <a:pPr>
-              <a:lnSpc>
-                <a:spcPct val="100000"/>
-              </a:lnSpc>
-            </a:pPr>
-            <a:r>
-              <a:rPr lang="en-IN" sz="3600">
-                <a:solidFill>
-                  <a:srgbClr val="000000"/>
-                </a:solidFill>
-                <a:latin typeface="Calibri"/>
-                <a:ea typeface="Verdana"/>
-              </a:rPr>
-              <a:t>Google-Sign-on the user is</a:t>
-            </a:r>
-            <a:endParaRPr/>
-          </a:p>
-          <a:p>
-            <a:pPr>
-              <a:lnSpc>
-                <a:spcPct val="100000"/>
-              </a:lnSpc>
-            </a:pPr>
-            <a:r>
-              <a:rPr lang="en-IN" sz="3600">
-                <a:solidFill>
-                  <a:srgbClr val="000000"/>
-                </a:solidFill>
-                <a:latin typeface="Calibri"/>
-                <a:ea typeface="Verdana"/>
-              </a:rPr>
-              <a:t>Authenticated by google</a:t>
-            </a:r>
-            <a:endParaRPr/>
-          </a:p>
-          <a:p>
-            <a:pPr>
-              <a:lnSpc>
-                <a:spcPct val="100000"/>
-              </a:lnSpc>
-            </a:pPr>
-            <a:r>
-              <a:rPr lang="en-IN" sz="3600">
-                <a:solidFill>
-                  <a:srgbClr val="000000"/>
-                </a:solidFill>
-                <a:latin typeface="Calibri"/>
-                <a:ea typeface="Verdana"/>
-              </a:rPr>
-              <a:t> </a:t>
-            </a:r>
-            <a:endParaRPr/>
-          </a:p>
-          <a:p>
-            <a:pPr>
-              <a:lnSpc>
-                <a:spcPct val="100000"/>
-              </a:lnSpc>
-            </a:pPr>
-            <a:r>
-              <a:rPr lang="en-IN" sz="3600">
+              <a:rPr b="1" lang="en-IN" sz="5700" spc="-1" strike="noStrike">
                 <a:solidFill>
                   <a:srgbClr val="2f99cd"/>
                 </a:solidFill>
-                <a:latin typeface="Calibri"/>
-                <a:ea typeface="Verdana"/>
-              </a:rPr>
-              <a:t>After authentication:</a:t>
-            </a:r>
-            <a:endParaRPr/>
-          </a:p>
-          <a:p>
-            <a:pPr>
-              <a:lnSpc>
-                <a:spcPct val="100000"/>
-              </a:lnSpc>
-            </a:pPr>
-            <a:r>
-              <a:rPr lang="en-IN" sz="3600">
-                <a:solidFill>
-                  <a:srgbClr val="000000"/>
-                </a:solidFill>
-                <a:latin typeface="Calibri"/>
-                <a:ea typeface="Verdana"/>
-              </a:rPr>
-              <a:t>As now the users </a:t>
-            </a:r>
-            <a:endParaRPr/>
-          </a:p>
-          <a:p>
-            <a:pPr>
-              <a:lnSpc>
-                <a:spcPct val="100000"/>
-              </a:lnSpc>
-            </a:pPr>
-            <a:r>
-              <a:rPr lang="en-IN" sz="3600">
-                <a:solidFill>
-                  <a:srgbClr val="000000"/>
-                </a:solidFill>
-                <a:latin typeface="Calibri"/>
-                <a:ea typeface="Verdana"/>
-              </a:rPr>
-              <a:t>credentials are available </a:t>
-            </a:r>
-            <a:endParaRPr/>
-          </a:p>
-          <a:p>
-            <a:pPr>
-              <a:lnSpc>
-                <a:spcPct val="100000"/>
-              </a:lnSpc>
-            </a:pPr>
-            <a:r>
-              <a:rPr lang="en-IN" sz="3600">
-                <a:solidFill>
-                  <a:srgbClr val="000000"/>
-                </a:solidFill>
-                <a:latin typeface="Calibri"/>
-                <a:ea typeface="Verdana"/>
-              </a:rPr>
-              <a:t>At the check_login() endpoint </a:t>
-            </a:r>
-            <a:endParaRPr/>
-          </a:p>
-          <a:p>
-            <a:pPr>
-              <a:lnSpc>
-                <a:spcPct val="100000"/>
-              </a:lnSpc>
-            </a:pPr>
-            <a:r>
-              <a:rPr lang="en-IN" sz="3600">
-                <a:solidFill>
-                  <a:srgbClr val="000000"/>
-                </a:solidFill>
-                <a:latin typeface="Calibri"/>
-                <a:ea typeface="Verdana"/>
-              </a:rPr>
-              <a:t>of the oauth service.</a:t>
-            </a:r>
-            <a:endParaRPr/>
-          </a:p>
-          <a:p>
-            <a:pPr>
-              <a:lnSpc>
-                <a:spcPct val="100000"/>
-              </a:lnSpc>
-            </a:pPr>
-            <a:endParaRPr/>
-          </a:p>
-          <a:p>
-            <a:pPr>
-              <a:lnSpc>
-                <a:spcPct val="100000"/>
-              </a:lnSpc>
-            </a:pPr>
-            <a:r>
-              <a:rPr lang="en-IN" sz="3600">
-                <a:solidFill>
-                  <a:srgbClr val="000000"/>
-                </a:solidFill>
-                <a:latin typeface="Calibri"/>
-                <a:ea typeface="Verdana"/>
-              </a:rPr>
-              <a:t> </a:t>
-            </a:r>
-            <a:r>
-              <a:rPr lang="en-IN" sz="3600">
-                <a:solidFill>
-                  <a:srgbClr val="2f99cd"/>
-                </a:solidFill>
+                <a:uFill>
+                  <a:solidFill>
+                    <a:srgbClr val="ffffff"/>
+                  </a:solidFill>
+                </a:uFill>
                 <a:latin typeface="Calibri"/>
                 <a:ea typeface="Verdana"/>
               </a:rPr>
               <a:t>Logout:</a:t>
             </a:r>
-            <a:endParaRPr/>
+            <a:endParaRPr b="0" lang="en-IN" sz="1800" spc="-1" strike="noStrike">
+              <a:solidFill>
+                <a:srgbClr val="000000"/>
+              </a:solidFill>
+              <a:uFill>
+                <a:solidFill>
+                  <a:srgbClr val="ffffff"/>
+                </a:solidFill>
+              </a:uFill>
+              <a:latin typeface="Arial"/>
+            </a:endParaRPr>
           </a:p>
           <a:p>
             <a:pPr>
@@ -1970,107 +3159,44 @@
               </a:lnSpc>
             </a:pPr>
             <a:r>
-              <a:rPr lang="en-IN" sz="3600">
+              <a:rPr b="0" lang="en-IN" sz="4800" spc="-1" strike="noStrike">
                 <a:solidFill>
                   <a:srgbClr val="000000"/>
                 </a:solidFill>
+                <a:uFill>
+                  <a:solidFill>
+                    <a:srgbClr val="ffffff"/>
+                  </a:solidFill>
+                </a:uFill>
                 <a:latin typeface="Calibri"/>
                 <a:ea typeface="Verdana"/>
               </a:rPr>
-              <a:t>User is logged out of all the </a:t>
+              <a:t>User is logged out of all the microservice</a:t>
             </a:r>
-            <a:endParaRPr/>
-          </a:p>
-          <a:p>
-            <a:pPr>
-              <a:lnSpc>
-                <a:spcPct val="100000"/>
-              </a:lnSpc>
-            </a:pPr>
-            <a:r>
-              <a:rPr lang="en-IN" sz="3600">
-                <a:solidFill>
-                  <a:srgbClr val="000000"/>
-                </a:solidFill>
-                <a:latin typeface="Calibri"/>
-                <a:ea typeface="Verdana"/>
-              </a:rPr>
-              <a:t>microservices</a:t>
-            </a:r>
-            <a:endParaRPr/>
-          </a:p>
-          <a:p>
-            <a:pPr>
-              <a:lnSpc>
-                <a:spcPct val="100000"/>
-              </a:lnSpc>
-            </a:pPr>
-            <a:r>
-              <a:rPr lang="en-IN" sz="3600">
-                <a:solidFill>
-                  <a:srgbClr val="000000"/>
-                </a:solidFill>
-                <a:latin typeface="Calibri"/>
-                <a:ea typeface="Verdana"/>
-              </a:rPr>
-              <a:t>  </a:t>
-            </a:r>
-            <a:endParaRPr/>
-          </a:p>
-          <a:p>
-            <a:pPr>
-              <a:lnSpc>
-                <a:spcPct val="100000"/>
-              </a:lnSpc>
-            </a:pPr>
-            <a:endParaRPr/>
-          </a:p>
-          <a:p>
-            <a:pPr>
-              <a:lnSpc>
-                <a:spcPct val="100000"/>
-              </a:lnSpc>
-            </a:pPr>
-            <a:r>
-              <a:rPr lang="en-IN" sz="4800">
-                <a:solidFill>
-                  <a:srgbClr val="000000"/>
-                </a:solidFill>
-                <a:latin typeface="Calibri"/>
-                <a:ea typeface="Verdana"/>
-              </a:rPr>
-              <a:t> </a:t>
-            </a:r>
-            <a:endParaRPr/>
-          </a:p>
-          <a:p>
-            <a:pPr>
-              <a:lnSpc>
-                <a:spcPct val="100000"/>
-              </a:lnSpc>
-            </a:pPr>
-            <a:endParaRPr/>
-          </a:p>
-          <a:p>
-            <a:pPr>
-              <a:lnSpc>
-                <a:spcPct val="100000"/>
-              </a:lnSpc>
-            </a:pPr>
-            <a:endParaRPr/>
+            <a:endParaRPr b="0" lang="en-IN" sz="1800" spc="-1" strike="noStrike">
+              <a:solidFill>
+                <a:srgbClr val="000000"/>
+              </a:solidFill>
+              <a:uFill>
+                <a:solidFill>
+                  <a:srgbClr val="ffffff"/>
+                </a:solidFill>
+              </a:uFill>
+              <a:latin typeface="Arial"/>
+            </a:endParaRPr>
           </a:p>
         </p:txBody>
       </p:sp>
       <p:sp>
         <p:nvSpPr>
-          <p:cNvPr id="45" name="CustomShape 9"/>
+          <p:cNvPr id="46" name="CustomShape 10"/>
           <p:cNvSpPr/>
           <p:nvPr/>
         </p:nvSpPr>
         <p:spPr>
           <a:xfrm>
-            <a:off x="24598800" y="4947840"/>
-            <a:ext cx="15550200" cy="6443640"/>
+            <a:off x="580680" y="4289040"/>
+            <a:ext cx="10219320" cy="6444000"/>
           </a:xfrm>
           <a:prstGeom prst="rect">
             <a:avLst/>
@@ -2080,6 +3206,12 @@
             <a:noFill/>
           </a:ln>
         </p:spPr>
+        <p:style>
+          <a:lnRef idx="0"/>
+          <a:fillRef idx="0"/>
+          <a:effectRef idx="0"/>
+          <a:fontRef idx="minor"/>
+        </p:style>
         <p:txBody>
           <a:bodyPr lIns="182880" rIns="182880" tIns="91440" bIns="91440"/>
           <a:p>
@@ -2089,24 +3221,49 @@
               </a:lnSpc>
             </a:pPr>
             <a:r>
-              <a:rPr b="1" lang="en-IN" sz="5700">
+              <a:rPr b="1" lang="en-IN" sz="5700" spc="-1" strike="noStrike">
                 <a:solidFill>
                   <a:srgbClr val="2f99cd"/>
                 </a:solidFill>
+                <a:uFill>
+                  <a:solidFill>
+                    <a:srgbClr val="ffffff"/>
+                  </a:solidFill>
+                </a:uFill>
                 <a:latin typeface="Calibri"/>
                 <a:ea typeface="DejaVu Sans"/>
               </a:rPr>
               <a:t>AIM</a:t>
             </a:r>
-            <a:endParaRPr/>
-          </a:p>
-          <a:p>
-            <a:pPr>
-              <a:lnSpc>
-                <a:spcPct val="100000"/>
-              </a:lnSpc>
-            </a:pPr>
-            <a:endParaRPr/>
+            <a:endParaRPr b="0" lang="en-IN" sz="1800" spc="-1" strike="noStrike">
+              <a:solidFill>
+                <a:srgbClr val="000000"/>
+              </a:solidFill>
+              <a:uFill>
+                <a:solidFill>
+                  <a:srgbClr val="ffffff"/>
+                </a:solidFill>
+              </a:uFill>
+              <a:latin typeface="Arial"/>
+            </a:endParaRPr>
+          </a:p>
+          <a:p>
+            <a:pPr>
+              <a:lnSpc>
+                <a:spcPct val="100000"/>
+              </a:lnSpc>
+            </a:pPr>
+            <a:endParaRPr b="0" lang="en-IN" sz="1800" spc="-1" strike="noStrike">
+              <a:solidFill>
+                <a:srgbClr val="000000"/>
+              </a:solidFill>
+              <a:uFill>
+                <a:solidFill>
+                  <a:srgbClr val="ffffff"/>
+                </a:solidFill>
+              </a:uFill>
+              <a:latin typeface="Arial"/>
+            </a:endParaRPr>
           </a:p>
           <a:p>
             <a:pPr>
@@ -2115,37 +3272,62 @@
               </a:lnSpc>
             </a:pPr>
             <a:r>
-              <a:rPr lang="en-IN" sz="4800">
+              <a:rPr b="0" lang="en-IN" sz="4800" spc="-1" strike="noStrike">
                 <a:solidFill>
                   <a:srgbClr val="000000"/>
                 </a:solidFill>
+                <a:uFill>
+                  <a:solidFill>
+                    <a:srgbClr val="ffffff"/>
+                  </a:solidFill>
+                </a:uFill>
                 <a:latin typeface="Calibri"/>
                 <a:ea typeface="Verdana"/>
               </a:rPr>
-              <a:t>VLabs follows a microservice acrchitectural style to increase modularity and allow for scaling. With different services sitting on different servers authorization in between is required. Also from the user perspective, an authentication system allowing for Single-Sign On was also needed.  </a:t>
+              <a:t>VLabs follows a microservice acrchitectural style to increase modularity and allow for scaling. With different services sitting on different servers authorization in between is required. An authentication system allowing for Single-Sign On is also needed.  </a:t>
             </a:r>
-            <a:endParaRPr/>
-          </a:p>
-          <a:p>
-            <a:pPr>
-              <a:lnSpc>
-                <a:spcPct val="100000"/>
-              </a:lnSpc>
-            </a:pPr>
-            <a:endParaRPr/>
+            <a:endParaRPr b="0" lang="en-IN" sz="1800" spc="-1" strike="noStrike">
+              <a:solidFill>
+                <a:srgbClr val="000000"/>
+              </a:solidFill>
+              <a:uFill>
+                <a:solidFill>
+                  <a:srgbClr val="ffffff"/>
+                </a:solidFill>
+              </a:uFill>
+              <a:latin typeface="Arial"/>
+            </a:endParaRPr>
+          </a:p>
+          <a:p>
+            <a:pPr>
+              <a:lnSpc>
+                <a:spcPct val="100000"/>
+              </a:lnSpc>
+            </a:pPr>
+            <a:endParaRPr b="0" lang="en-IN" sz="1800" spc="-1" strike="noStrike">
+              <a:solidFill>
+                <a:srgbClr val="000000"/>
+              </a:solidFill>
+              <a:uFill>
+                <a:solidFill>
+                  <a:srgbClr val="ffffff"/>
+                </a:solidFill>
+              </a:uFill>
+              <a:latin typeface="Arial"/>
+            </a:endParaRPr>
           </a:p>
         </p:txBody>
       </p:sp>
       <p:sp>
         <p:nvSpPr>
-          <p:cNvPr id="46" name="CustomShape 10"/>
+          <p:cNvPr id="47" name="CustomShape 11"/>
           <p:cNvSpPr/>
           <p:nvPr/>
         </p:nvSpPr>
         <p:spPr>
           <a:xfrm>
-            <a:off x="24598800" y="11161800"/>
-            <a:ext cx="15550200" cy="3381480"/>
+            <a:off x="24625440" y="12726360"/>
+            <a:ext cx="15550560" cy="3381840"/>
           </a:xfrm>
           <a:prstGeom prst="rect">
             <a:avLst/>
@@ -2155,6 +3337,12 @@
             <a:noFill/>
           </a:ln>
         </p:spPr>
+        <p:style>
+          <a:lnRef idx="0"/>
+          <a:fillRef idx="0"/>
+          <a:effectRef idx="0"/>
+          <a:fontRef idx="minor"/>
+        </p:style>
         <p:txBody>
           <a:bodyPr lIns="182880" rIns="182880" tIns="91440" bIns="91440"/>
           <a:p>
@@ -2164,16 +3352,31 @@
               </a:lnSpc>
             </a:pPr>
             <a:r>
-              <a:rPr b="1" lang="en-IN" sz="5700">
+              <a:rPr b="1" lang="en-IN" sz="5700" spc="-1" strike="noStrike">
                 <a:solidFill>
                   <a:srgbClr val="2f99cd"/>
                 </a:solidFill>
+                <a:uFill>
+                  <a:solidFill>
+                    <a:srgbClr val="ffffff"/>
+                  </a:solidFill>
+                </a:uFill>
                 <a:latin typeface="Calibri"/>
                 <a:ea typeface="Verdana"/>
               </a:rPr>
               <a:t>RESULTS</a:t>
             </a:r>
-            <a:endParaRPr/>
+            <a:endParaRPr b="0" lang="en-IN" sz="1800" spc="-1" strike="noStrike">
+              <a:solidFill>
+                <a:srgbClr val="000000"/>
+              </a:solidFill>
+              <a:uFill>
+                <a:solidFill>
+                  <a:srgbClr val="ffffff"/>
+                </a:solidFill>
+              </a:uFill>
+              <a:latin typeface="Arial"/>
+            </a:endParaRPr>
           </a:p>
           <a:p>
             <a:pPr>
@@ -2182,16 +3385,31 @@
               </a:lnSpc>
             </a:pPr>
             <a:r>
-              <a:rPr b="1" lang="en-IN" sz="5700">
+              <a:rPr b="1" lang="en-IN" sz="5700" spc="-1" strike="noStrike">
                 <a:solidFill>
                   <a:srgbClr val="2f99cd"/>
                 </a:solidFill>
+                <a:uFill>
+                  <a:solidFill>
+                    <a:srgbClr val="ffffff"/>
+                  </a:solidFill>
+                </a:uFill>
                 <a:latin typeface="Calibri"/>
                 <a:ea typeface="Verdana"/>
               </a:rPr>
               <a:t>Phase 1</a:t>
             </a:r>
-            <a:endParaRPr/>
+            <a:endParaRPr b="0" lang="en-IN" sz="1800" spc="-1" strike="noStrike">
+              <a:solidFill>
+                <a:srgbClr val="000000"/>
+              </a:solidFill>
+              <a:uFill>
+                <a:solidFill>
+                  <a:srgbClr val="ffffff"/>
+                </a:solidFill>
+              </a:uFill>
+              <a:latin typeface="Arial"/>
+            </a:endParaRPr>
           </a:p>
           <a:p>
             <a:pPr>
@@ -2200,29 +3418,44 @@
               </a:lnSpc>
             </a:pPr>
             <a:r>
-              <a:rPr lang="en-IN" sz="4800">
+              <a:rPr b="0" lang="en-IN" sz="4800" spc="-1" strike="noStrike">
                 <a:solidFill>
                   <a:srgbClr val="000000"/>
                 </a:solidFill>
+                <a:uFill>
+                  <a:solidFill>
+                    <a:srgbClr val="ffffff"/>
+                  </a:solidFill>
+                </a:uFill>
                 <a:latin typeface="Calibri"/>
                 <a:ea typeface="Verdana"/>
               </a:rPr>
               <a:t>After analysis of various standards, we decided to use an approach encorporating the Oauth protocol.</a:t>
             </a:r>
-            <a:endParaRPr/>
+            <a:endParaRPr b="0" lang="en-IN" sz="1800" spc="-1" strike="noStrike">
+              <a:solidFill>
+                <a:srgbClr val="000000"/>
+              </a:solidFill>
+              <a:uFill>
+                <a:solidFill>
+                  <a:srgbClr val="ffffff"/>
+                </a:solidFill>
+              </a:uFill>
+              <a:latin typeface="Arial"/>
+            </a:endParaRPr>
           </a:p>
         </p:txBody>
       </p:sp>
       <p:sp>
         <p:nvSpPr>
-          <p:cNvPr id="47" name="CustomShape 11"/>
+          <p:cNvPr id="48" name="CustomShape 12"/>
           <p:cNvSpPr/>
           <p:nvPr/>
         </p:nvSpPr>
         <p:spPr>
           <a:xfrm>
             <a:off x="24598800" y="17948160"/>
-            <a:ext cx="15550200" cy="6581880"/>
+            <a:ext cx="15550560" cy="6582240"/>
           </a:xfrm>
           <a:prstGeom prst="rect">
             <a:avLst/>
@@ -2232,6 +3465,12 @@
             <a:noFill/>
           </a:ln>
         </p:spPr>
+        <p:style>
+          <a:lnRef idx="0"/>
+          <a:fillRef idx="0"/>
+          <a:effectRef idx="0"/>
+          <a:fontRef idx="minor"/>
+        </p:style>
         <p:txBody>
           <a:bodyPr lIns="182880" rIns="182880" tIns="91440" bIns="91440"/>
           <a:p>
@@ -2241,24 +3480,49 @@
               </a:lnSpc>
             </a:pPr>
             <a:r>
-              <a:rPr b="1" lang="en-IN" sz="5700">
+              <a:rPr b="1" lang="en-IN" sz="5700" spc="-1" strike="noStrike">
                 <a:solidFill>
                   <a:srgbClr val="2f99cd"/>
                 </a:solidFill>
+                <a:uFill>
+                  <a:solidFill>
+                    <a:srgbClr val="ffffff"/>
+                  </a:solidFill>
+                </a:uFill>
                 <a:latin typeface="Calibri"/>
                 <a:ea typeface="Verdana"/>
               </a:rPr>
-              <a:t>CONCLUSIONS ~Have none other than maybe put what i put for results here instead.</a:t>
+              <a:t>CONCLUSIONS </a:t>
             </a:r>
-            <a:endParaRPr/>
-          </a:p>
-          <a:p>
-            <a:pPr>
-              <a:lnSpc>
-                <a:spcPct val="100000"/>
-              </a:lnSpc>
-            </a:pPr>
-            <a:endParaRPr/>
+            <a:endParaRPr b="0" lang="en-IN" sz="1800" spc="-1" strike="noStrike">
+              <a:solidFill>
+                <a:srgbClr val="000000"/>
+              </a:solidFill>
+              <a:uFill>
+                <a:solidFill>
+                  <a:srgbClr val="ffffff"/>
+                </a:solidFill>
+              </a:uFill>
+              <a:latin typeface="Arial"/>
+            </a:endParaRPr>
+          </a:p>
+          <a:p>
+            <a:pPr>
+              <a:lnSpc>
+                <a:spcPct val="100000"/>
+              </a:lnSpc>
+            </a:pPr>
+            <a:endParaRPr b="0" lang="en-IN" sz="1800" spc="-1" strike="noStrike">
+              <a:solidFill>
+                <a:srgbClr val="000000"/>
+              </a:solidFill>
+              <a:uFill>
+                <a:solidFill>
+                  <a:srgbClr val="ffffff"/>
+                </a:solidFill>
+              </a:uFill>
+              <a:latin typeface="Arial"/>
+            </a:endParaRPr>
           </a:p>
           <a:p>
             <a:pPr>
@@ -2267,16 +3531,31 @@
               </a:lnSpc>
             </a:pPr>
             <a:r>
-              <a:rPr b="1" lang="en-IN" sz="5700">
+              <a:rPr b="1" lang="en-IN" sz="5700" spc="-1" strike="noStrike">
                 <a:solidFill>
                   <a:srgbClr val="2f99cd"/>
                 </a:solidFill>
+                <a:uFill>
+                  <a:solidFill>
+                    <a:srgbClr val="ffffff"/>
+                  </a:solidFill>
+                </a:uFill>
                 <a:latin typeface="Calibri"/>
                 <a:ea typeface="Verdana"/>
               </a:rPr>
               <a:t>Phase 1</a:t>
             </a:r>
-            <a:endParaRPr/>
+            <a:endParaRPr b="0" lang="en-IN" sz="1800" spc="-1" strike="noStrike">
+              <a:solidFill>
+                <a:srgbClr val="000000"/>
+              </a:solidFill>
+              <a:uFill>
+                <a:solidFill>
+                  <a:srgbClr val="ffffff"/>
+                </a:solidFill>
+              </a:uFill>
+              <a:latin typeface="Arial"/>
+            </a:endParaRPr>
           </a:p>
           <a:p>
             <a:pPr>
@@ -2285,37 +3564,62 @@
               </a:lnSpc>
             </a:pPr>
             <a:r>
-              <a:rPr lang="en-IN" sz="4800">
+              <a:rPr b="0" lang="en-IN" sz="4800" spc="-1" strike="noStrike">
                 <a:solidFill>
                   <a:srgbClr val="000000"/>
                 </a:solidFill>
+                <a:uFill>
+                  <a:solidFill>
+                    <a:srgbClr val="ffffff"/>
+                  </a:solidFill>
+                </a:uFill>
                 <a:latin typeface="Calibri"/>
                 <a:ea typeface="Verdana"/>
               </a:rPr>
-              <a:t>Use an Oauth protocol based system to provide both authentication(via user flow) and authorization between services(server flow). </a:t>
+              <a:t>Decided that we should use an Oauth protocol based system to provide both authentication(via user flow) and authorization between services(server flow). </a:t>
             </a:r>
-            <a:endParaRPr/>
-          </a:p>
-          <a:p>
-            <a:pPr>
-              <a:lnSpc>
-                <a:spcPct val="100000"/>
-              </a:lnSpc>
-            </a:pPr>
-            <a:endParaRPr/>
+            <a:endParaRPr b="0" lang="en-IN" sz="1800" spc="-1" strike="noStrike">
+              <a:solidFill>
+                <a:srgbClr val="000000"/>
+              </a:solidFill>
+              <a:uFill>
+                <a:solidFill>
+                  <a:srgbClr val="ffffff"/>
+                </a:solidFill>
+              </a:uFill>
+              <a:latin typeface="Arial"/>
+            </a:endParaRPr>
+          </a:p>
+          <a:p>
+            <a:pPr>
+              <a:lnSpc>
+                <a:spcPct val="100000"/>
+              </a:lnSpc>
+            </a:pPr>
+            <a:endParaRPr b="0" lang="en-IN" sz="1800" spc="-1" strike="noStrike">
+              <a:solidFill>
+                <a:srgbClr val="000000"/>
+              </a:solidFill>
+              <a:uFill>
+                <a:solidFill>
+                  <a:srgbClr val="ffffff"/>
+                </a:solidFill>
+              </a:uFill>
+              <a:latin typeface="Arial"/>
+            </a:endParaRPr>
           </a:p>
         </p:txBody>
       </p:sp>
       <p:sp>
         <p:nvSpPr>
-          <p:cNvPr id="48" name="CustomShape 12"/>
+          <p:cNvPr id="49" name="CustomShape 13"/>
           <p:cNvSpPr/>
           <p:nvPr/>
         </p:nvSpPr>
         <p:spPr>
           <a:xfrm>
             <a:off x="29325240" y="25952040"/>
-            <a:ext cx="11585880" cy="1782360"/>
+            <a:ext cx="11586240" cy="1782720"/>
           </a:xfrm>
           <a:prstGeom prst="rect">
             <a:avLst/>
@@ -2325,6 +3629,12 @@
             <a:noFill/>
           </a:ln>
         </p:spPr>
+        <p:style>
+          <a:lnRef idx="0"/>
+          <a:fillRef idx="0"/>
+          <a:effectRef idx="0"/>
+          <a:fontRef idx="minor"/>
+        </p:style>
         <p:txBody>
           <a:bodyPr lIns="182880" rIns="182880" tIns="91440" bIns="91440"/>
           <a:p>
@@ -2334,16 +3644,31 @@
               </a:lnSpc>
             </a:pPr>
             <a:r>
-              <a:rPr lang="en-IN" sz="3500">
+              <a:rPr b="0" lang="en-IN" sz="3500" spc="-1" strike="noStrike">
                 <a:solidFill>
                   <a:srgbClr val="808080"/>
                 </a:solidFill>
+                <a:uFill>
+                  <a:solidFill>
+                    <a:srgbClr val="ffffff"/>
+                  </a:solidFill>
+                </a:uFill>
                 <a:latin typeface="Calibri"/>
                 <a:ea typeface="DejaVu Sans"/>
               </a:rPr>
               <a:t>Projit Bandyopadhyay, </a:t>
             </a:r>
-            <a:endParaRPr/>
+            <a:endParaRPr b="0" lang="en-IN" sz="1800" spc="-1" strike="noStrike">
+              <a:solidFill>
+                <a:srgbClr val="000000"/>
+              </a:solidFill>
+              <a:uFill>
+                <a:solidFill>
+                  <a:srgbClr val="ffffff"/>
+                </a:solidFill>
+              </a:uFill>
+              <a:latin typeface="Arial"/>
+            </a:endParaRPr>
           </a:p>
           <a:p>
             <a:pPr>
@@ -2352,43 +3677,66 @@
               </a:lnSpc>
             </a:pPr>
             <a:r>
-              <a:rPr lang="en-IN" sz="3500">
+              <a:rPr b="0" lang="en-IN" sz="3500" spc="-1" strike="noStrike">
                 <a:solidFill>
                   <a:srgbClr val="808080"/>
                 </a:solidFill>
+                <a:uFill>
+                  <a:solidFill>
+                    <a:srgbClr val="ffffff"/>
+                  </a:solidFill>
+                </a:uFill>
                 <a:latin typeface="Calibri"/>
                 <a:ea typeface="DejaVu Sans"/>
               </a:rPr>
               <a:t>Shubh Maheshwari</a:t>
             </a:r>
-            <a:endParaRPr/>
-          </a:p>
-          <a:p>
-            <a:pPr>
-              <a:lnSpc>
-                <a:spcPct val="100000"/>
-              </a:lnSpc>
-            </a:pPr>
-            <a:endParaRPr/>
+            <a:endParaRPr b="0" lang="en-IN" sz="1800" spc="-1" strike="noStrike">
+              <a:solidFill>
+                <a:srgbClr val="000000"/>
+              </a:solidFill>
+              <a:uFill>
+                <a:solidFill>
+                  <a:srgbClr val="ffffff"/>
+                </a:solidFill>
+              </a:uFill>
+              <a:latin typeface="Arial"/>
+            </a:endParaRPr>
+          </a:p>
+          <a:p>
+            <a:pPr>
+              <a:lnSpc>
+                <a:spcPct val="100000"/>
+              </a:lnSpc>
+            </a:pPr>
+            <a:endParaRPr b="0" lang="en-IN" sz="1800" spc="-1" strike="noStrike">
+              <a:solidFill>
+                <a:srgbClr val="000000"/>
+              </a:solidFill>
+              <a:uFill>
+                <a:solidFill>
+                  <a:srgbClr val="ffffff"/>
+                </a:solidFill>
+              </a:uFill>
+              <a:latin typeface="Arial"/>
+            </a:endParaRPr>
           </a:p>
         </p:txBody>
       </p:sp>
       <p:pic>
         <p:nvPicPr>
-          <p:cNvPr id="49" name="" descr=""/>
+          <p:cNvPr id="50" name="" descr=""/>
           <p:cNvPicPr/>
           <p:nvPr/>
         </p:nvPicPr>
         <p:blipFill>
           <a:blip r:embed="rId1"/>
-          <a:stretch>
-            <a:fillRect/>
-          </a:stretch>
+          <a:stretch/>
         </p:blipFill>
         <p:spPr>
           <a:xfrm>
             <a:off x="24750360" y="24741000"/>
-            <a:ext cx="4421520" cy="2954520"/>
+            <a:ext cx="4421880" cy="2954880"/>
           </a:xfrm>
           <a:prstGeom prst="rect">
             <a:avLst/>
@@ -2398,297 +3746,6 @@
           </a:ln>
         </p:spPr>
       </p:pic>
-      <p:sp>
-        <p:nvSpPr>
-          <p:cNvPr id="50" name="CustomShape 13"/>
-          <p:cNvSpPr/>
-          <p:nvPr/>
-        </p:nvSpPr>
-        <p:spPr>
-          <a:xfrm>
-            <a:off x="1577160" y="4947840"/>
-            <a:ext cx="10334880" cy="23203800"/>
-          </a:xfrm>
-          <a:prstGeom prst="rect">
-            <a:avLst/>
-          </a:prstGeom>
-          <a:noFill/>
-          <a:ln>
-            <a:noFill/>
-          </a:ln>
-        </p:spPr>
-        <p:txBody>
-          <a:bodyPr lIns="182880" rIns="182880" tIns="91440" bIns="91440"/>
-          <a:p>
-            <a:pPr>
-              <a:lnSpc>
-                <a:spcPct val="100000"/>
-              </a:lnSpc>
-            </a:pPr>
-            <a:r>
-              <a:rPr b="1" lang="en-IN" sz="5700">
-                <a:solidFill>
-                  <a:srgbClr val="2f99cd"/>
-                </a:solidFill>
-                <a:latin typeface="Calibri"/>
-                <a:ea typeface="Verdana"/>
-              </a:rPr>
-              <a:t>INTRODUCTION</a:t>
-            </a:r>
-            <a:endParaRPr/>
-          </a:p>
-          <a:p>
-            <a:pPr>
-              <a:lnSpc>
-                <a:spcPct val="100000"/>
-              </a:lnSpc>
-            </a:pPr>
-            <a:endParaRPr/>
-          </a:p>
-          <a:p>
-            <a:pPr>
-              <a:lnSpc>
-                <a:spcPct val="100000"/>
-              </a:lnSpc>
-            </a:pPr>
-            <a:r>
-              <a:rPr lang="en-IN" sz="3600">
-                <a:solidFill>
-                  <a:srgbClr val="000000"/>
-                </a:solidFill>
-                <a:latin typeface="Calibri"/>
-                <a:ea typeface="Verdana"/>
-              </a:rPr>
-              <a:t>We are trying to make an oauth service using google as a single sign-on followed by common authorizarion for all the microservices</a:t>
-            </a:r>
-            <a:endParaRPr/>
-          </a:p>
-          <a:p>
-            <a:pPr>
-              <a:lnSpc>
-                <a:spcPct val="100000"/>
-              </a:lnSpc>
-            </a:pPr>
-            <a:endParaRPr/>
-          </a:p>
-          <a:p>
-            <a:pPr>
-              <a:lnSpc>
-                <a:spcPct val="100000"/>
-              </a:lnSpc>
-            </a:pPr>
-            <a:r>
-              <a:rPr lang="en-IN" sz="3600">
-                <a:solidFill>
-                  <a:srgbClr val="000000"/>
-                </a:solidFill>
-                <a:latin typeface="Calibri"/>
-                <a:ea typeface="Verdana"/>
-              </a:rPr>
-              <a:t>The Project could be split up into two phases:</a:t>
-            </a:r>
-            <a:endParaRPr/>
-          </a:p>
-          <a:p>
-            <a:pPr>
-              <a:lnSpc>
-                <a:spcPct val="100000"/>
-              </a:lnSpc>
-            </a:pPr>
-            <a:r>
-              <a:rPr lang="en-IN" sz="3600">
-                <a:solidFill>
-                  <a:srgbClr val="000000"/>
-                </a:solidFill>
-                <a:latin typeface="Calibri"/>
-                <a:ea typeface="Verdana"/>
-              </a:rPr>
-              <a:t>1. Surveying and Research</a:t>
-            </a:r>
-            <a:endParaRPr/>
-          </a:p>
-          <a:p>
-            <a:pPr>
-              <a:lnSpc>
-                <a:spcPct val="100000"/>
-              </a:lnSpc>
-            </a:pPr>
-            <a:r>
-              <a:rPr lang="en-IN" sz="3600">
-                <a:solidFill>
-                  <a:srgbClr val="000000"/>
-                </a:solidFill>
-                <a:latin typeface="Calibri"/>
-                <a:ea typeface="Verdana"/>
-              </a:rPr>
-              <a:t>2. Implemenntation of the model </a:t>
-            </a:r>
-            <a:endParaRPr/>
-          </a:p>
-          <a:p>
-            <a:pPr>
-              <a:lnSpc>
-                <a:spcPct val="100000"/>
-              </a:lnSpc>
-            </a:pPr>
-            <a:endParaRPr/>
-          </a:p>
-          <a:p>
-            <a:pPr>
-              <a:lnSpc>
-                <a:spcPct val="100000"/>
-              </a:lnSpc>
-            </a:pPr>
-            <a:r>
-              <a:rPr b="1" lang="en-IN" sz="3600">
-                <a:solidFill>
-                  <a:srgbClr val="2f99cd"/>
-                </a:solidFill>
-                <a:latin typeface="Calibri"/>
-                <a:ea typeface="Verdana"/>
-              </a:rPr>
-              <a:t>Phase 1</a:t>
-            </a:r>
-            <a:endParaRPr/>
-          </a:p>
-          <a:p>
-            <a:pPr>
-              <a:lnSpc>
-                <a:spcPct val="100000"/>
-              </a:lnSpc>
-            </a:pPr>
-            <a:endParaRPr/>
-          </a:p>
-          <a:p>
-            <a:pPr>
-              <a:lnSpc>
-                <a:spcPct val="100000"/>
-              </a:lnSpc>
-            </a:pPr>
-            <a:r>
-              <a:rPr lang="en-IN" sz="3600">
-                <a:solidFill>
-                  <a:srgbClr val="000000"/>
-                </a:solidFill>
-                <a:latin typeface="Calibri"/>
-                <a:ea typeface="Verdana"/>
-              </a:rPr>
-              <a:t>We needed to survey current industrial standards according to our requirements and look for for possible solutions.</a:t>
-            </a:r>
-            <a:endParaRPr/>
-          </a:p>
-          <a:p>
-            <a:pPr>
-              <a:lnSpc>
-                <a:spcPct val="100000"/>
-              </a:lnSpc>
-            </a:pPr>
-            <a:endParaRPr/>
-          </a:p>
-          <a:p>
-            <a:pPr>
-              <a:lnSpc>
-                <a:spcPct val="100000"/>
-              </a:lnSpc>
-            </a:pPr>
-            <a:r>
-              <a:rPr b="1" lang="en-IN" sz="3600">
-                <a:solidFill>
-                  <a:srgbClr val="2f99cd"/>
-                </a:solidFill>
-                <a:latin typeface="Calibri"/>
-                <a:ea typeface="Verdana"/>
-              </a:rPr>
-              <a:t>Phase 2 </a:t>
-            </a:r>
-            <a:endParaRPr/>
-          </a:p>
-          <a:p>
-            <a:pPr>
-              <a:lnSpc>
-                <a:spcPct val="100000"/>
-              </a:lnSpc>
-            </a:pPr>
-            <a:endParaRPr/>
-          </a:p>
-          <a:p>
-            <a:pPr>
-              <a:lnSpc>
-                <a:spcPct val="100000"/>
-              </a:lnSpc>
-            </a:pPr>
-            <a:r>
-              <a:rPr lang="en-IN" sz="3600">
-                <a:solidFill>
-                  <a:srgbClr val="000000"/>
-                </a:solidFill>
-                <a:latin typeface="Calibri"/>
-                <a:ea typeface="Verdana"/>
-              </a:rPr>
-              <a:t>We have done an impelentation of the oauth service model using an Oauth Server,a client Server and LDS dashboard, an existing VLEAD microservice. </a:t>
-            </a:r>
-            <a:endParaRPr/>
-          </a:p>
-          <a:p>
-            <a:pPr>
-              <a:lnSpc>
-                <a:spcPct val="100000"/>
-              </a:lnSpc>
-            </a:pPr>
-            <a:r>
-              <a:rPr lang="en-IN" sz="4800">
-                <a:solidFill>
-                  <a:srgbClr val="000000"/>
-                </a:solidFill>
-                <a:latin typeface="Calibri"/>
-                <a:ea typeface="Verdana"/>
-              </a:rPr>
-              <a:t>	</a:t>
-            </a:r>
-            <a:endParaRPr/>
-          </a:p>
-          <a:p>
-            <a:pPr>
-              <a:lnSpc>
-                <a:spcPct val="100000"/>
-              </a:lnSpc>
-            </a:pPr>
-            <a:endParaRPr/>
-          </a:p>
-          <a:p>
-            <a:pPr>
-              <a:lnSpc>
-                <a:spcPct val="100000"/>
-              </a:lnSpc>
-            </a:pPr>
-            <a:endParaRPr/>
-          </a:p>
-          <a:p>
-            <a:pPr>
-              <a:lnSpc>
-                <a:spcPct val="100000"/>
-              </a:lnSpc>
-            </a:pPr>
-            <a:endParaRPr/>
-          </a:p>
-          <a:p>
-            <a:pPr>
-              <a:lnSpc>
-                <a:spcPct val="100000"/>
-              </a:lnSpc>
-            </a:pPr>
-            <a:endParaRPr/>
-          </a:p>
-          <a:p>
-            <a:pPr>
-              <a:lnSpc>
-                <a:spcPct val="100000"/>
-              </a:lnSpc>
-            </a:pPr>
-            <a:endParaRPr/>
-          </a:p>
-        </p:txBody>
-      </p:sp>
       <p:pic>
         <p:nvPicPr>
           <p:cNvPr id="51" name="" descr=""/>
@@ -2697,14 +3754,12 @@
         </p:nvPicPr>
         <p:blipFill>
           <a:blip r:embed="rId2"/>
-          <a:stretch>
-            <a:fillRect/>
-          </a:stretch>
+          <a:stretch/>
         </p:blipFill>
         <p:spPr>
           <a:xfrm>
-            <a:off x="17064000" y="8055720"/>
-            <a:ext cx="6400080" cy="1952280"/>
+            <a:off x="24632280" y="5176080"/>
+            <a:ext cx="6399720" cy="1951920"/>
           </a:xfrm>
           <a:prstGeom prst="rect">
             <a:avLst/>
@@ -2722,14 +3777,12 @@
         </p:nvPicPr>
         <p:blipFill>
           <a:blip r:embed="rId3"/>
-          <a:stretch>
-            <a:fillRect/>
-          </a:stretch>
+          <a:stretch/>
         </p:blipFill>
         <p:spPr>
           <a:xfrm>
-            <a:off x="22032000" y="10944000"/>
-            <a:ext cx="1285560" cy="971280"/>
+            <a:off x="32760000" y="4705560"/>
+            <a:ext cx="2634840" cy="1990440"/>
           </a:xfrm>
           <a:prstGeom prst="rect">
             <a:avLst/>
@@ -2747,14 +3800,12 @@
         </p:nvPicPr>
         <p:blipFill>
           <a:blip r:embed="rId4"/>
-          <a:stretch>
-            <a:fillRect/>
-          </a:stretch>
+          <a:stretch/>
         </p:blipFill>
         <p:spPr>
           <a:xfrm>
-            <a:off x="19872000" y="12960000"/>
-            <a:ext cx="3592080" cy="2804760"/>
+            <a:off x="32508000" y="7779600"/>
+            <a:ext cx="3591720" cy="2804400"/>
           </a:xfrm>
           <a:prstGeom prst="rect">
             <a:avLst/>
@@ -2772,14 +3823,12 @@
         </p:nvPicPr>
         <p:blipFill>
           <a:blip r:embed="rId5"/>
-          <a:stretch>
-            <a:fillRect/>
-          </a:stretch>
+          <a:stretch/>
         </p:blipFill>
         <p:spPr>
           <a:xfrm>
-            <a:off x="19713240" y="16447320"/>
-            <a:ext cx="3476160" cy="3095280"/>
+            <a:off x="38232000" y="4752000"/>
+            <a:ext cx="3888000" cy="3462120"/>
           </a:xfrm>
           <a:prstGeom prst="rect">
             <a:avLst/>
@@ -2797,14 +3846,12 @@
         </p:nvPicPr>
         <p:blipFill>
           <a:blip r:embed="rId6"/>
-          <a:stretch>
-            <a:fillRect/>
-          </a:stretch>
+          <a:stretch/>
         </p:blipFill>
         <p:spPr>
           <a:xfrm>
-            <a:off x="15264000" y="20016000"/>
-            <a:ext cx="8712000" cy="447480"/>
+            <a:off x="30024360" y="11288880"/>
+            <a:ext cx="8711640" cy="447120"/>
           </a:xfrm>
           <a:prstGeom prst="rect">
             <a:avLst/>
@@ -2814,49 +3861,6 @@
           </a:ln>
         </p:spPr>
       </p:pic>
-      <p:graphicFrame>
-        <p:nvGraphicFramePr>
-          <p:cNvPr id="56" name="Object 14"/>
-          <p:cNvGraphicFramePr/>
-          <p:nvPr/>
-        </p:nvGraphicFramePr>
-        <p:xfrm>
-          <a:off x="19771200" y="14727240"/>
-          <a:ext cx="3251160" cy="812520"/>
-        </p:xfrm>
-        <a:graphic>
-          <a:graphicData uri="http://schemas.openxmlformats.org/presentationml/2006/ole">
-            <p:oleObj name="Spreadsheet" r:id="rId7">
-              <p:embed/>
-              <p:pic>
-                <p:nvPicPr>
-                  <p:cNvPr id="57" name="" descr=""/>
-                  <p:cNvPicPr/>
-                  <p:nvPr/>
-                </p:nvPicPr>
-                <p:blipFill>
-                  <a:blip r:embed="rId8"/>
-                  <a:stretch>
-                    <a:fillRect/>
-                  </a:stretch>
-                </p:blipFill>
-                <p:spPr>
-                  <a:xfrm>
-                    <a:off x="19771200" y="14727240"/>
-                    <a:ext cx="3251160" cy="812520"/>
-                  </a:xfrm>
-                  <a:prstGeom prst="rect">
-                    <a:avLst/>
-                  </a:prstGeom>
-                  <a:ln>
-                    <a:noFill/>
-                  </a:ln>
-                </p:spPr>
-              </p:pic>
-            </p:oleObj>
-          </a:graphicData>
-        </a:graphic>
-      </p:graphicFrame>
     </p:spTree>
   </p:cSld>
   <p:timing>

</xml_diff>